<commit_message>
DeveloperGuide.adoc: Updated switch implementation details
</commit_message>
<xml_diff>
--- a/docs/diagrams/UndoRedoSequenceDiagram.pptx
+++ b/docs/diagrams/UndoRedoSequenceDiagram.pptx
@@ -126,10 +126,6 @@
 </p:presentation>
 </file>
 
-<file path=ppt/revisionInfo.xml><?xml version="1.0" encoding="utf-8"?>
-<p1510:revInfo xmlns:a="http://schemas.openxmlformats.org/drawingml/2006/main" xmlns:r="http://schemas.openxmlformats.org/officeDocument/2006/relationships" xmlns:p1510="http://schemas.microsoft.com/office/powerpoint/2015/10/main"/>
-</file>
-
 <file path=ppt/notesMasters/notesMaster1.xml><?xml version="1.0" encoding="utf-8"?>
 <p:notesMaster xmlns:a="http://schemas.openxmlformats.org/drawingml/2006/main" xmlns:r="http://schemas.openxmlformats.org/officeDocument/2006/relationships" xmlns:p="http://schemas.openxmlformats.org/presentationml/2006/main">
   <p:cSld>
@@ -212,7 +208,7 @@
           <a:p>
             <a:fld id="{F5CC4B3F-88C1-4FFA-B1B6-F41C21DC6924}" type="datetimeFigureOut">
               <a:rPr lang="en-US" smtClean="0"/>
-              <a:t>7/6/2018</a:t>
+              <a:t>10/16/2018</a:t>
             </a:fld>
             <a:endParaRPr lang="en-US"/>
           </a:p>
@@ -658,7 +654,7 @@
           <a:p>
             <a:fld id="{78C97017-6FC3-485B-9764-EAC9E56C1D49}" type="datetimeFigureOut">
               <a:rPr lang="en-US" smtClean="0"/>
-              <a:t>7/6/2018</a:t>
+              <a:t>10/16/2018</a:t>
             </a:fld>
             <a:endParaRPr lang="en-US"/>
           </a:p>
@@ -826,7 +822,7 @@
           <a:p>
             <a:fld id="{78C97017-6FC3-485B-9764-EAC9E56C1D49}" type="datetimeFigureOut">
               <a:rPr lang="en-US" smtClean="0"/>
-              <a:t>7/6/2018</a:t>
+              <a:t>10/16/2018</a:t>
             </a:fld>
             <a:endParaRPr lang="en-US"/>
           </a:p>
@@ -1004,7 +1000,7 @@
           <a:p>
             <a:fld id="{78C97017-6FC3-485B-9764-EAC9E56C1D49}" type="datetimeFigureOut">
               <a:rPr lang="en-US" smtClean="0"/>
-              <a:t>7/6/2018</a:t>
+              <a:t>10/16/2018</a:t>
             </a:fld>
             <a:endParaRPr lang="en-US"/>
           </a:p>
@@ -1172,7 +1168,7 @@
           <a:p>
             <a:fld id="{78C97017-6FC3-485B-9764-EAC9E56C1D49}" type="datetimeFigureOut">
               <a:rPr lang="en-US" smtClean="0"/>
-              <a:t>7/6/2018</a:t>
+              <a:t>10/16/2018</a:t>
             </a:fld>
             <a:endParaRPr lang="en-US"/>
           </a:p>
@@ -1417,7 +1413,7 @@
           <a:p>
             <a:fld id="{78C97017-6FC3-485B-9764-EAC9E56C1D49}" type="datetimeFigureOut">
               <a:rPr lang="en-US" smtClean="0"/>
-              <a:t>7/6/2018</a:t>
+              <a:t>10/16/2018</a:t>
             </a:fld>
             <a:endParaRPr lang="en-US"/>
           </a:p>
@@ -1702,7 +1698,7 @@
           <a:p>
             <a:fld id="{78C97017-6FC3-485B-9764-EAC9E56C1D49}" type="datetimeFigureOut">
               <a:rPr lang="en-US" smtClean="0"/>
-              <a:t>7/6/2018</a:t>
+              <a:t>10/16/2018</a:t>
             </a:fld>
             <a:endParaRPr lang="en-US"/>
           </a:p>
@@ -2121,7 +2117,7 @@
           <a:p>
             <a:fld id="{78C97017-6FC3-485B-9764-EAC9E56C1D49}" type="datetimeFigureOut">
               <a:rPr lang="en-US" smtClean="0"/>
-              <a:t>7/6/2018</a:t>
+              <a:t>10/16/2018</a:t>
             </a:fld>
             <a:endParaRPr lang="en-US"/>
           </a:p>
@@ -2238,7 +2234,7 @@
           <a:p>
             <a:fld id="{78C97017-6FC3-485B-9764-EAC9E56C1D49}" type="datetimeFigureOut">
               <a:rPr lang="en-US" smtClean="0"/>
-              <a:t>7/6/2018</a:t>
+              <a:t>10/16/2018</a:t>
             </a:fld>
             <a:endParaRPr lang="en-US"/>
           </a:p>
@@ -2333,7 +2329,7 @@
           <a:p>
             <a:fld id="{78C97017-6FC3-485B-9764-EAC9E56C1D49}" type="datetimeFigureOut">
               <a:rPr lang="en-US" smtClean="0"/>
-              <a:t>7/6/2018</a:t>
+              <a:t>10/16/2018</a:t>
             </a:fld>
             <a:endParaRPr lang="en-US"/>
           </a:p>
@@ -2608,7 +2604,7 @@
           <a:p>
             <a:fld id="{78C97017-6FC3-485B-9764-EAC9E56C1D49}" type="datetimeFigureOut">
               <a:rPr lang="en-US" smtClean="0"/>
-              <a:t>7/6/2018</a:t>
+              <a:t>10/16/2018</a:t>
             </a:fld>
             <a:endParaRPr lang="en-US"/>
           </a:p>
@@ -2860,7 +2856,7 @@
           <a:p>
             <a:fld id="{78C97017-6FC3-485B-9764-EAC9E56C1D49}" type="datetimeFigureOut">
               <a:rPr lang="en-US" smtClean="0"/>
-              <a:t>7/6/2018</a:t>
+              <a:t>10/16/2018</a:t>
             </a:fld>
             <a:endParaRPr lang="en-US"/>
           </a:p>
@@ -3071,7 +3067,7 @@
           <a:p>
             <a:fld id="{78C97017-6FC3-485B-9764-EAC9E56C1D49}" type="datetimeFigureOut">
               <a:rPr lang="en-US" smtClean="0"/>
-              <a:t>7/6/2018</a:t>
+              <a:t>10/16/2018</a:t>
             </a:fld>
             <a:endParaRPr lang="en-US"/>
           </a:p>

</xml_diff>

<commit_message>
Update DeveloperGuide for addmh and viewmh feature, include sequence diagram
Resolved formatting issues of string representation of MedicalHistory.
</commit_message>
<xml_diff>
--- a/docs/diagrams/UndoRedoSequenceDiagram.pptx
+++ b/docs/diagrams/UndoRedoSequenceDiagram.pptx
@@ -126,10 +126,6 @@
 </p:presentation>
 </file>
 
-<file path=ppt/revisionInfo.xml><?xml version="1.0" encoding="utf-8"?>
-<p1510:revInfo xmlns:a="http://schemas.openxmlformats.org/drawingml/2006/main" xmlns:r="http://schemas.openxmlformats.org/officeDocument/2006/relationships" xmlns:p1510="http://schemas.microsoft.com/office/powerpoint/2015/10/main"/>
-</file>
-
 <file path=ppt/notesMasters/notesMaster1.xml><?xml version="1.0" encoding="utf-8"?>
 <p:notesMaster xmlns:a="http://schemas.openxmlformats.org/drawingml/2006/main" xmlns:r="http://schemas.openxmlformats.org/officeDocument/2006/relationships" xmlns:p="http://schemas.openxmlformats.org/presentationml/2006/main">
   <p:cSld>
@@ -212,7 +208,7 @@
           <a:p>
             <a:fld id="{F5CC4B3F-88C1-4FFA-B1B6-F41C21DC6924}" type="datetimeFigureOut">
               <a:rPr lang="en-US" smtClean="0"/>
-              <a:t>7/6/2018</a:t>
+              <a:t>10/16/2018</a:t>
             </a:fld>
             <a:endParaRPr lang="en-US"/>
           </a:p>
@@ -658,7 +654,7 @@
           <a:p>
             <a:fld id="{78C97017-6FC3-485B-9764-EAC9E56C1D49}" type="datetimeFigureOut">
               <a:rPr lang="en-US" smtClean="0"/>
-              <a:t>7/6/2018</a:t>
+              <a:t>10/16/2018</a:t>
             </a:fld>
             <a:endParaRPr lang="en-US"/>
           </a:p>
@@ -826,7 +822,7 @@
           <a:p>
             <a:fld id="{78C97017-6FC3-485B-9764-EAC9E56C1D49}" type="datetimeFigureOut">
               <a:rPr lang="en-US" smtClean="0"/>
-              <a:t>7/6/2018</a:t>
+              <a:t>10/16/2018</a:t>
             </a:fld>
             <a:endParaRPr lang="en-US"/>
           </a:p>
@@ -1004,7 +1000,7 @@
           <a:p>
             <a:fld id="{78C97017-6FC3-485B-9764-EAC9E56C1D49}" type="datetimeFigureOut">
               <a:rPr lang="en-US" smtClean="0"/>
-              <a:t>7/6/2018</a:t>
+              <a:t>10/16/2018</a:t>
             </a:fld>
             <a:endParaRPr lang="en-US"/>
           </a:p>
@@ -1172,7 +1168,7 @@
           <a:p>
             <a:fld id="{78C97017-6FC3-485B-9764-EAC9E56C1D49}" type="datetimeFigureOut">
               <a:rPr lang="en-US" smtClean="0"/>
-              <a:t>7/6/2018</a:t>
+              <a:t>10/16/2018</a:t>
             </a:fld>
             <a:endParaRPr lang="en-US"/>
           </a:p>
@@ -1417,7 +1413,7 @@
           <a:p>
             <a:fld id="{78C97017-6FC3-485B-9764-EAC9E56C1D49}" type="datetimeFigureOut">
               <a:rPr lang="en-US" smtClean="0"/>
-              <a:t>7/6/2018</a:t>
+              <a:t>10/16/2018</a:t>
             </a:fld>
             <a:endParaRPr lang="en-US"/>
           </a:p>
@@ -1702,7 +1698,7 @@
           <a:p>
             <a:fld id="{78C97017-6FC3-485B-9764-EAC9E56C1D49}" type="datetimeFigureOut">
               <a:rPr lang="en-US" smtClean="0"/>
-              <a:t>7/6/2018</a:t>
+              <a:t>10/16/2018</a:t>
             </a:fld>
             <a:endParaRPr lang="en-US"/>
           </a:p>
@@ -2121,7 +2117,7 @@
           <a:p>
             <a:fld id="{78C97017-6FC3-485B-9764-EAC9E56C1D49}" type="datetimeFigureOut">
               <a:rPr lang="en-US" smtClean="0"/>
-              <a:t>7/6/2018</a:t>
+              <a:t>10/16/2018</a:t>
             </a:fld>
             <a:endParaRPr lang="en-US"/>
           </a:p>
@@ -2238,7 +2234,7 @@
           <a:p>
             <a:fld id="{78C97017-6FC3-485B-9764-EAC9E56C1D49}" type="datetimeFigureOut">
               <a:rPr lang="en-US" smtClean="0"/>
-              <a:t>7/6/2018</a:t>
+              <a:t>10/16/2018</a:t>
             </a:fld>
             <a:endParaRPr lang="en-US"/>
           </a:p>
@@ -2333,7 +2329,7 @@
           <a:p>
             <a:fld id="{78C97017-6FC3-485B-9764-EAC9E56C1D49}" type="datetimeFigureOut">
               <a:rPr lang="en-US" smtClean="0"/>
-              <a:t>7/6/2018</a:t>
+              <a:t>10/16/2018</a:t>
             </a:fld>
             <a:endParaRPr lang="en-US"/>
           </a:p>
@@ -2608,7 +2604,7 @@
           <a:p>
             <a:fld id="{78C97017-6FC3-485B-9764-EAC9E56C1D49}" type="datetimeFigureOut">
               <a:rPr lang="en-US" smtClean="0"/>
-              <a:t>7/6/2018</a:t>
+              <a:t>10/16/2018</a:t>
             </a:fld>
             <a:endParaRPr lang="en-US"/>
           </a:p>
@@ -2860,7 +2856,7 @@
           <a:p>
             <a:fld id="{78C97017-6FC3-485B-9764-EAC9E56C1D49}" type="datetimeFigureOut">
               <a:rPr lang="en-US" smtClean="0"/>
-              <a:t>7/6/2018</a:t>
+              <a:t>10/16/2018</a:t>
             </a:fld>
             <a:endParaRPr lang="en-US"/>
           </a:p>
@@ -3071,7 +3067,7 @@
           <a:p>
             <a:fld id="{78C97017-6FC3-485B-9764-EAC9E56C1D49}" type="datetimeFigureOut">
               <a:rPr lang="en-US" smtClean="0"/>
-              <a:t>7/6/2018</a:t>
+              <a:t>10/16/2018</a:t>
             </a:fld>
             <a:endParaRPr lang="en-US"/>
           </a:p>
@@ -3454,8 +3450,8 @@
         </p:nvSpPr>
         <p:spPr>
           <a:xfrm>
-            <a:off x="6459374" y="118895"/>
-            <a:ext cx="3903825" cy="4400926"/>
+            <a:off x="6459374" y="118894"/>
+            <a:ext cx="3984805" cy="8315799"/>
           </a:xfrm>
           <a:prstGeom prst="roundRect">
             <a:avLst>
@@ -3515,8 +3511,8 @@
         </p:nvSpPr>
         <p:spPr>
           <a:xfrm>
-            <a:off x="467813" y="163018"/>
-            <a:ext cx="5863964" cy="4343400"/>
+            <a:off x="-152399" y="120683"/>
+            <a:ext cx="6454594" cy="8314010"/>
           </a:xfrm>
           <a:prstGeom prst="roundRect">
             <a:avLst>
@@ -3801,7 +3797,7 @@
         </p:nvCxnSpPr>
         <p:spPr>
           <a:xfrm>
-            <a:off x="4050587" y="907617"/>
+            <a:off x="3956199" y="907617"/>
             <a:ext cx="0" cy="1482984"/>
           </a:xfrm>
           <a:prstGeom prst="line">
@@ -3838,8 +3834,8 @@
         </p:nvSpPr>
         <p:spPr>
           <a:xfrm>
-            <a:off x="3978580" y="1365810"/>
-            <a:ext cx="154408" cy="767790"/>
+            <a:off x="3884192" y="1337736"/>
+            <a:ext cx="191760" cy="795864"/>
           </a:xfrm>
           <a:prstGeom prst="rect">
             <a:avLst/>
@@ -3887,14 +3883,13 @@
           <p:cNvCxnSpPr>
             <a:cxnSpLocks/>
             <a:stCxn id="21" idx="0"/>
-            <a:endCxn id="4" idx="0"/>
           </p:cNvCxnSpPr>
           <p:nvPr/>
         </p:nvCxnSpPr>
         <p:spPr>
           <a:xfrm>
-            <a:off x="5602082" y="1613633"/>
-            <a:ext cx="0" cy="2644578"/>
+            <a:off x="5029200" y="1705197"/>
+            <a:ext cx="17888" cy="2553014"/>
           </a:xfrm>
           <a:prstGeom prst="line">
             <a:avLst/>
@@ -3930,7 +3925,7 @@
         </p:nvSpPr>
         <p:spPr>
           <a:xfrm>
-            <a:off x="5525882" y="1613633"/>
+            <a:off x="4953000" y="1705197"/>
             <a:ext cx="152400" cy="276003"/>
           </a:xfrm>
           <a:prstGeom prst="rect">
@@ -3972,7 +3967,9 @@
       <p:cxnSp>
         <p:nvCxnSpPr>
           <p:cNvPr id="23" name="Straight Arrow Connector 22"/>
-          <p:cNvCxnSpPr/>
+          <p:cNvCxnSpPr>
+            <a:cxnSpLocks/>
+          </p:cNvCxnSpPr>
           <p:nvPr/>
         </p:nvCxnSpPr>
         <p:spPr>
@@ -4013,8 +4010,8 @@
         </p:nvSpPr>
         <p:spPr>
           <a:xfrm>
-            <a:off x="38100" y="990600"/>
-            <a:ext cx="1424846" cy="215444"/>
+            <a:off x="-152400" y="958034"/>
+            <a:ext cx="1729694" cy="215444"/>
           </a:xfrm>
           <a:prstGeom prst="rect">
             <a:avLst/>
@@ -4034,7 +4031,23 @@
                   <a:srgbClr val="0070C0"/>
                 </a:solidFill>
               </a:rPr>
-              <a:t>execute(“undo”)</a:t>
+              <a:t>execute(“</a:t>
+            </a:r>
+            <a:r>
+              <a:rPr lang="en-US" sz="1400" dirty="0" err="1">
+                <a:solidFill>
+                  <a:srgbClr val="0070C0"/>
+                </a:solidFill>
+              </a:rPr>
+              <a:t>addmh</a:t>
+            </a:r>
+            <a:r>
+              <a:rPr lang="en-US" sz="1400" dirty="0">
+                <a:solidFill>
+                  <a:srgbClr val="0070C0"/>
+                </a:solidFill>
+              </a:rPr>
+              <a:t> …”)</a:t>
             </a:r>
           </a:p>
         </p:txBody>
@@ -4042,7 +4055,9 @@
       <p:cxnSp>
         <p:nvCxnSpPr>
           <p:cNvPr id="28" name="Straight Arrow Connector 27"/>
-          <p:cNvCxnSpPr/>
+          <p:cNvCxnSpPr>
+            <a:cxnSpLocks/>
+          </p:cNvCxnSpPr>
           <p:nvPr/>
         </p:nvCxnSpPr>
         <p:spPr>
@@ -4083,7 +4098,7 @@
         </p:nvSpPr>
         <p:spPr>
           <a:xfrm>
-            <a:off x="3243421" y="2484071"/>
+            <a:off x="2192191" y="2484071"/>
             <a:ext cx="855809" cy="215444"/>
           </a:xfrm>
           <a:prstGeom prst="rect">
@@ -4118,13 +4133,15 @@
       <p:cxnSp>
         <p:nvCxnSpPr>
           <p:cNvPr id="34" name="Straight Arrow Connector 33"/>
-          <p:cNvCxnSpPr/>
+          <p:cNvCxnSpPr>
+            <a:cxnSpLocks/>
+          </p:cNvCxnSpPr>
           <p:nvPr/>
         </p:nvCxnSpPr>
         <p:spPr>
           <a:xfrm>
             <a:off x="4109108" y="1878232"/>
-            <a:ext cx="1492974" cy="0"/>
+            <a:ext cx="843892" cy="11404"/>
           </a:xfrm>
           <a:prstGeom prst="straightConnector1">
             <a:avLst/>
@@ -4163,8 +4180,8 @@
         </p:nvCxnSpPr>
         <p:spPr>
           <a:xfrm>
-            <a:off x="1691351" y="2133600"/>
-            <a:ext cx="2348067" cy="0"/>
+            <a:off x="1691351" y="1981200"/>
+            <a:ext cx="2104508" cy="0"/>
           </a:xfrm>
           <a:prstGeom prst="straightConnector1">
             <a:avLst/>
@@ -4196,7 +4213,9 @@
       <p:cxnSp>
         <p:nvCxnSpPr>
           <p:cNvPr id="37" name="Straight Arrow Connector 36"/>
-          <p:cNvCxnSpPr/>
+          <p:cNvCxnSpPr>
+            <a:cxnSpLocks/>
+          </p:cNvCxnSpPr>
           <p:nvPr/>
         </p:nvCxnSpPr>
         <p:spPr>
@@ -4239,8 +4258,8 @@
         </p:nvSpPr>
         <p:spPr>
           <a:xfrm>
-            <a:off x="5526488" y="2731313"/>
-            <a:ext cx="161322" cy="1307285"/>
+            <a:off x="4953000" y="2653307"/>
+            <a:ext cx="207694" cy="1385292"/>
           </a:xfrm>
           <a:prstGeom prst="rect">
             <a:avLst/>
@@ -4286,8 +4305,8 @@
         </p:nvSpPr>
         <p:spPr>
           <a:xfrm>
-            <a:off x="5651548" y="2748246"/>
-            <a:ext cx="1298078" cy="184666"/>
+            <a:off x="5285911" y="3168134"/>
+            <a:ext cx="1876889" cy="184666"/>
           </a:xfrm>
           <a:prstGeom prst="rect">
             <a:avLst/>
@@ -4311,23 +4330,14 @@
             </a:lvl1pPr>
           </a:lstStyle>
           <a:p>
-            <a:r>
-              <a:rPr lang="en-US" sz="1200" dirty="0" err="1">
-                <a:solidFill>
-                  <a:schemeClr val="accent4">
-                    <a:lumMod val="75000"/>
-                  </a:schemeClr>
-                </a:solidFill>
-              </a:rPr>
-              <a:t>undo</a:t>
-            </a:r>
+            <a:pPr algn="l"/>
             <a:r>
               <a:rPr lang="en-US" sz="1200" dirty="0" err="1">
                 <a:solidFill>
                   <a:srgbClr val="7030A0"/>
                 </a:solidFill>
               </a:rPr>
-              <a:t>AddressBook</a:t>
+              <a:t>updatePerson</a:t>
             </a:r>
             <a:r>
               <a:rPr lang="en-US" sz="1200" dirty="0">
@@ -4335,7 +4345,7 @@
                   <a:srgbClr val="7030A0"/>
                 </a:solidFill>
               </a:rPr>
-              <a:t>()</a:t>
+              <a:t>(model, history)</a:t>
             </a:r>
             <a:endParaRPr lang="en-US" sz="1200" dirty="0"/>
           </a:p>
@@ -4349,8 +4359,8 @@
         </p:nvSpPr>
         <p:spPr>
           <a:xfrm>
-            <a:off x="1885189" y="1106150"/>
-            <a:ext cx="1899551" cy="215444"/>
+            <a:off x="1447800" y="1106151"/>
+            <a:ext cx="2348059" cy="215444"/>
           </a:xfrm>
           <a:prstGeom prst="rect">
             <a:avLst/>
@@ -4380,7 +4390,15 @@
             </a:r>
             <a:r>
               <a:rPr lang="en-US" dirty="0"/>
-              <a:t>(“undo”)</a:t>
+              <a:t>(“</a:t>
+            </a:r>
+            <a:r>
+              <a:rPr lang="en-US" dirty="0" err="1"/>
+              <a:t>addmh</a:t>
+            </a:r>
+            <a:r>
+              <a:rPr lang="en-US" dirty="0"/>
+              <a:t> …”)</a:t>
             </a:r>
           </a:p>
         </p:txBody>
@@ -4393,7 +4411,7 @@
         </p:nvSpPr>
         <p:spPr>
           <a:xfrm>
-            <a:off x="3272755" y="3791076"/>
+            <a:off x="2133600" y="3791076"/>
             <a:ext cx="621216" cy="215444"/>
           </a:xfrm>
           <a:prstGeom prst="rect">
@@ -4473,7 +4491,7 @@
         </p:nvSpPr>
         <p:spPr>
           <a:xfrm>
-            <a:off x="7497155" y="2568606"/>
+            <a:off x="7709814" y="2568606"/>
             <a:ext cx="2181777" cy="335427"/>
           </a:xfrm>
           <a:prstGeom prst="rect">
@@ -4540,7 +4558,7 @@
         </p:nvSpPr>
         <p:spPr>
           <a:xfrm>
-            <a:off x="8514207" y="3182840"/>
+            <a:off x="8726866" y="3182840"/>
             <a:ext cx="129933" cy="398562"/>
           </a:xfrm>
           <a:prstGeom prst="rect">
@@ -4587,7 +4605,7 @@
         </p:nvSpPr>
         <p:spPr>
           <a:xfrm>
-            <a:off x="2724792" y="1905793"/>
+            <a:off x="2590800" y="1752600"/>
             <a:ext cx="220343" cy="215444"/>
           </a:xfrm>
           <a:prstGeom prst="rect">
@@ -4614,7 +4632,7 @@
           <a:p>
             <a:r>
               <a:rPr lang="en-US" dirty="0"/>
-              <a:t>u</a:t>
+              <a:t>a</a:t>
             </a:r>
           </a:p>
         </p:txBody>
@@ -4627,7 +4645,7 @@
         </p:nvSpPr>
         <p:spPr>
           <a:xfrm>
-            <a:off x="6549765" y="2362200"/>
+            <a:off x="6762424" y="2362200"/>
             <a:ext cx="841636" cy="300180"/>
           </a:xfrm>
           <a:prstGeom prst="rect">
@@ -4688,7 +4706,7 @@
         </p:nvCxnSpPr>
         <p:spPr>
           <a:xfrm flipH="1">
-            <a:off x="6986491" y="2653306"/>
+            <a:off x="7199150" y="2653306"/>
             <a:ext cx="3959" cy="1735710"/>
           </a:xfrm>
           <a:prstGeom prst="line">
@@ -4725,7 +4743,7 @@
         </p:nvSpPr>
         <p:spPr>
           <a:xfrm>
-            <a:off x="6887527" y="2958106"/>
+            <a:off x="7100186" y="2958106"/>
             <a:ext cx="168896" cy="775693"/>
           </a:xfrm>
           <a:prstGeom prst="rect">
@@ -4773,9 +4791,9 @@
           <p:nvPr/>
         </p:nvCxnSpPr>
         <p:spPr>
-          <a:xfrm>
-            <a:off x="5685755" y="2975344"/>
-            <a:ext cx="1210345" cy="0"/>
+          <a:xfrm flipV="1">
+            <a:off x="5158639" y="2975344"/>
+            <a:ext cx="1935995" cy="1"/>
           </a:xfrm>
           <a:prstGeom prst="straightConnector1">
             <a:avLst/>
@@ -4804,39 +4822,6 @@
       </p:cxnSp>
       <p:sp>
         <p:nvSpPr>
-          <p:cNvPr id="4" name="TextBox 3"/>
-          <p:cNvSpPr txBox="1"/>
-          <p:nvPr/>
-        </p:nvSpPr>
-        <p:spPr>
-          <a:xfrm>
-            <a:off x="5472880" y="4258211"/>
-            <a:ext cx="258404" cy="261610"/>
-          </a:xfrm>
-          <a:prstGeom prst="rect">
-            <a:avLst/>
-          </a:prstGeom>
-          <a:noFill/>
-        </p:spPr>
-        <p:txBody>
-          <a:bodyPr wrap="none" rtlCol="0">
-            <a:spAutoFit/>
-          </a:bodyPr>
-          <a:lstStyle/>
-          <a:p>
-            <a:r>
-              <a:rPr lang="en-SG" sz="1100" dirty="0">
-                <a:solidFill>
-                  <a:srgbClr val="002060"/>
-                </a:solidFill>
-              </a:rPr>
-              <a:t>X</a:t>
-            </a:r>
-          </a:p>
-        </p:txBody>
-      </p:sp>
-      <p:sp>
-        <p:nvSpPr>
           <p:cNvPr id="19" name="Rectangle 62"/>
           <p:cNvSpPr/>
           <p:nvPr/>
@@ -4844,7 +4829,7 @@
         <p:spPr>
           <a:xfrm>
             <a:off x="5035976" y="1260268"/>
-            <a:ext cx="1093635" cy="461538"/>
+            <a:ext cx="1935995" cy="226877"/>
           </a:xfrm>
           <a:prstGeom prst="rect">
             <a:avLst/>
@@ -4884,22 +4869,15 @@
                   <a:schemeClr val="bg1"/>
                 </a:solidFill>
               </a:rPr>
-              <a:t>u:Undo</a:t>
-            </a:r>
-            <a:br>
-              <a:rPr lang="en-US" sz="1600" dirty="0">
+              <a:t>a: </a:t>
+            </a:r>
+            <a:r>
+              <a:rPr lang="en-US" sz="1600" dirty="0" err="1">
                 <a:solidFill>
                   <a:schemeClr val="bg1"/>
                 </a:solidFill>
               </a:rPr>
-            </a:br>
-            <a:r>
-              <a:rPr lang="en-US" sz="1600" dirty="0">
-                <a:solidFill>
-                  <a:schemeClr val="bg1"/>
-                </a:solidFill>
-              </a:rPr>
-              <a:t>Command</a:t>
+              <a:t>AddmhCommand</a:t>
             </a:r>
             <a:endParaRPr lang="en-SG" sz="1600" dirty="0">
               <a:solidFill>
@@ -4924,9 +4902,9 @@
           <p:nvPr/>
         </p:nvCxnSpPr>
         <p:spPr>
-          <a:xfrm>
-            <a:off x="1691351" y="2731314"/>
-            <a:ext cx="3832164" cy="1"/>
+          <a:xfrm flipV="1">
+            <a:off x="1691351" y="2699515"/>
+            <a:ext cx="3251889" cy="31801"/>
           </a:xfrm>
           <a:prstGeom prst="straightConnector1">
             <a:avLst/>
@@ -4968,9 +4946,9 @@
           <p:nvPr/>
         </p:nvCxnSpPr>
         <p:spPr>
-          <a:xfrm>
-            <a:off x="1708245" y="1363918"/>
-            <a:ext cx="2256705" cy="1"/>
+          <a:xfrm flipV="1">
+            <a:off x="1708245" y="1351537"/>
+            <a:ext cx="2187935" cy="12381"/>
           </a:xfrm>
           <a:prstGeom prst="straightConnector1">
             <a:avLst/>
@@ -5008,13 +4986,14 @@
           </p:cNvPr>
           <p:cNvCxnSpPr>
             <a:cxnSpLocks/>
+            <a:endCxn id="65" idx="2"/>
           </p:cNvCxnSpPr>
           <p:nvPr/>
         </p:nvCxnSpPr>
         <p:spPr>
           <a:xfrm>
             <a:off x="1691998" y="4036462"/>
-            <a:ext cx="3831517" cy="0"/>
+            <a:ext cx="3364849" cy="2137"/>
           </a:xfrm>
           <a:prstGeom prst="straightConnector1">
             <a:avLst/>
@@ -5043,27 +5022,69 @@
           </a:fontRef>
         </p:style>
       </p:cxnSp>
-      <p:sp>
-        <p:nvSpPr>
-          <p:cNvPr id="88" name="TextBox 87">
+      <p:cxnSp>
+        <p:nvCxnSpPr>
+          <p:cNvPr id="89" name="Straight Connector 88">
             <a:extLst>
               <a:ext uri="{FF2B5EF4-FFF2-40B4-BE49-F238E27FC236}">
-                <a16:creationId xmlns:a16="http://schemas.microsoft.com/office/drawing/2014/main" id="{B85C6184-7378-4E89-A338-72B1E5056F4F}"/>
+                <a16:creationId xmlns:a16="http://schemas.microsoft.com/office/drawing/2014/main" id="{E4E1C8CA-49DF-45D8-80A5-D5C8282EE927}"/>
               </a:ext>
             </a:extLst>
           </p:cNvPr>
+          <p:cNvCxnSpPr>
+            <a:cxnSpLocks/>
+          </p:cNvCxnSpPr>
+          <p:nvPr/>
+        </p:nvCxnSpPr>
+        <p:spPr>
+          <a:xfrm>
+            <a:off x="8800702" y="2871355"/>
+            <a:ext cx="17996" cy="1467648"/>
+          </a:xfrm>
+          <a:prstGeom prst="line">
+            <a:avLst/>
+          </a:prstGeom>
+          <a:ln w="19050">
+            <a:solidFill>
+              <a:srgbClr val="7030A0"/>
+            </a:solidFill>
+            <a:prstDash val="sysDash"/>
+          </a:ln>
+          <a:effectLst/>
+        </p:spPr>
+        <p:style>
+          <a:lnRef idx="1">
+            <a:schemeClr val="accent1"/>
+          </a:lnRef>
+          <a:fillRef idx="2">
+            <a:schemeClr val="accent1"/>
+          </a:fillRef>
+          <a:effectRef idx="1">
+            <a:schemeClr val="accent1"/>
+          </a:effectRef>
+          <a:fontRef idx="minor">
+            <a:schemeClr val="dk1"/>
+          </a:fontRef>
+        </p:style>
+      </p:cxnSp>
+      <p:sp>
+        <p:nvSpPr>
+          <p:cNvPr id="41" name="TextBox 40"/>
           <p:cNvSpPr txBox="1"/>
           <p:nvPr/>
         </p:nvSpPr>
         <p:spPr>
           <a:xfrm>
-            <a:off x="8769530" y="3267337"/>
-            <a:ext cx="2120786" cy="184666"/>
+            <a:off x="7826375" y="2975344"/>
+            <a:ext cx="2460625" cy="184666"/>
           </a:xfrm>
           <a:prstGeom prst="rect">
             <a:avLst/>
           </a:prstGeom>
           <a:noFill/>
+          <a:ln>
+            <a:noFill/>
+          </a:ln>
         </p:spPr>
         <p:txBody>
           <a:bodyPr wrap="square" lIns="0" tIns="0" rIns="0" bIns="0" rtlCol="0">
@@ -5082,130 +5103,14 @@
             </a:lvl1pPr>
           </a:lstStyle>
           <a:p>
+            <a:pPr algn="l"/>
             <a:r>
               <a:rPr lang="en-US" sz="1200" dirty="0" err="1">
                 <a:solidFill>
                   <a:srgbClr val="7030A0"/>
                 </a:solidFill>
               </a:rPr>
-              <a:t>resetData</a:t>
-            </a:r>
-            <a:r>
-              <a:rPr lang="en-US" sz="1200" dirty="0">
-                <a:solidFill>
-                  <a:srgbClr val="7030A0"/>
-                </a:solidFill>
-              </a:rPr>
-              <a:t>(</a:t>
-            </a:r>
-            <a:r>
-              <a:rPr lang="en-US" sz="1200" dirty="0" err="1">
-                <a:solidFill>
-                  <a:srgbClr val="7030A0"/>
-                </a:solidFill>
-              </a:rPr>
-              <a:t>ReadOnlyAddressBook</a:t>
-            </a:r>
-            <a:r>
-              <a:rPr lang="en-US" sz="1200" dirty="0">
-                <a:solidFill>
-                  <a:srgbClr val="7030A0"/>
-                </a:solidFill>
-              </a:rPr>
-              <a:t>)</a:t>
-            </a:r>
-            <a:endParaRPr lang="en-US" sz="1200" dirty="0"/>
-          </a:p>
-        </p:txBody>
-      </p:sp>
-      <p:cxnSp>
-        <p:nvCxnSpPr>
-          <p:cNvPr id="89" name="Straight Connector 88">
-            <a:extLst>
-              <a:ext uri="{FF2B5EF4-FFF2-40B4-BE49-F238E27FC236}">
-                <a16:creationId xmlns:a16="http://schemas.microsoft.com/office/drawing/2014/main" id="{E4E1C8CA-49DF-45D8-80A5-D5C8282EE927}"/>
-              </a:ext>
-            </a:extLst>
-          </p:cNvPr>
-          <p:cNvCxnSpPr>
-            <a:cxnSpLocks/>
-          </p:cNvCxnSpPr>
-          <p:nvPr/>
-        </p:nvCxnSpPr>
-        <p:spPr>
-          <a:xfrm>
-            <a:off x="8588043" y="2871355"/>
-            <a:ext cx="17996" cy="1467648"/>
-          </a:xfrm>
-          <a:prstGeom prst="line">
-            <a:avLst/>
-          </a:prstGeom>
-          <a:ln w="19050">
-            <a:solidFill>
-              <a:srgbClr val="7030A0"/>
-            </a:solidFill>
-            <a:prstDash val="sysDash"/>
-          </a:ln>
-          <a:effectLst/>
-        </p:spPr>
-        <p:style>
-          <a:lnRef idx="1">
-            <a:schemeClr val="accent1"/>
-          </a:lnRef>
-          <a:fillRef idx="2">
-            <a:schemeClr val="accent1"/>
-          </a:fillRef>
-          <a:effectRef idx="1">
-            <a:schemeClr val="accent1"/>
-          </a:effectRef>
-          <a:fontRef idx="minor">
-            <a:schemeClr val="dk1"/>
-          </a:fontRef>
-        </p:style>
-      </p:cxnSp>
-      <p:sp>
-        <p:nvSpPr>
-          <p:cNvPr id="41" name="TextBox 40"/>
-          <p:cNvSpPr txBox="1"/>
-          <p:nvPr/>
-        </p:nvSpPr>
-        <p:spPr>
-          <a:xfrm>
-            <a:off x="7667691" y="2975344"/>
-            <a:ext cx="551687" cy="184666"/>
-          </a:xfrm>
-          <a:prstGeom prst="rect">
-            <a:avLst/>
-          </a:prstGeom>
-          <a:noFill/>
-          <a:ln>
-            <a:noFill/>
-          </a:ln>
-        </p:spPr>
-        <p:txBody>
-          <a:bodyPr wrap="square" lIns="0" tIns="0" rIns="0" bIns="0" rtlCol="0">
-            <a:spAutoFit/>
-          </a:bodyPr>
-          <a:lstStyle>
-            <a:defPPr>
-              <a:defRPr lang="en-US"/>
-            </a:defPPr>
-            <a:lvl1pPr algn="r">
-              <a:defRPr sz="1400">
-                <a:solidFill>
-                  <a:srgbClr val="0070C0"/>
-                </a:solidFill>
-              </a:defRPr>
-            </a:lvl1pPr>
-          </a:lstStyle>
-          <a:p>
-            <a:r>
-              <a:rPr lang="en-US" sz="1200" dirty="0">
-                <a:solidFill>
-                  <a:srgbClr val="7030A0"/>
-                </a:solidFill>
-              </a:rPr>
-              <a:t>undo</a:t>
+              <a:t>updatePerson</a:t>
             </a:r>
             <a:r>
               <a:rPr lang="en-US" sz="1200" dirty="0">
@@ -5215,50 +5120,31 @@
                   </a:schemeClr>
                 </a:solidFill>
               </a:rPr>
-              <a:t>()</a:t>
-            </a:r>
-          </a:p>
-        </p:txBody>
-      </p:sp>
-      <p:cxnSp>
-        <p:nvCxnSpPr>
-          <p:cNvPr id="13" name="Curved Connector 12"/>
-          <p:cNvCxnSpPr/>
-          <p:nvPr/>
-        </p:nvCxnSpPr>
-        <p:spPr>
-          <a:xfrm rot="16200000" flipH="1">
-            <a:off x="8527578" y="3220579"/>
-            <a:ext cx="156923" cy="76200"/>
-          </a:xfrm>
-          <a:prstGeom prst="curvedConnector4">
-            <a:avLst>
-              <a:gd name="adj1" fmla="val -145677"/>
-              <a:gd name="adj2" fmla="val 400000"/>
-            </a:avLst>
-          </a:prstGeom>
-          <a:ln>
-            <a:solidFill>
-              <a:srgbClr val="7030A0"/>
-            </a:solidFill>
-            <a:tailEnd type="triangle"/>
-          </a:ln>
-        </p:spPr>
-        <p:style>
-          <a:lnRef idx="1">
-            <a:schemeClr val="accent1"/>
-          </a:lnRef>
-          <a:fillRef idx="0">
-            <a:schemeClr val="accent1"/>
-          </a:fillRef>
-          <a:effectRef idx="0">
-            <a:schemeClr val="accent1"/>
-          </a:effectRef>
-          <a:fontRef idx="minor">
-            <a:schemeClr val="tx1"/>
-          </a:fontRef>
-        </p:style>
-      </p:cxnSp>
+              <a:t>(target, </a:t>
+            </a:r>
+            <a:r>
+              <a:rPr lang="en-US" sz="1200" dirty="0" err="1">
+                <a:solidFill>
+                  <a:schemeClr val="accent4">
+                    <a:lumMod val="75000"/>
+                  </a:schemeClr>
+                </a:solidFill>
+              </a:rPr>
+              <a:t>editedPerson</a:t>
+            </a:r>
+            <a:r>
+              <a:rPr lang="en-US" sz="1200" dirty="0">
+                <a:solidFill>
+                  <a:schemeClr val="accent4">
+                    <a:lumMod val="75000"/>
+                  </a:schemeClr>
+                </a:solidFill>
+              </a:rPr>
+              <a:t>)</a:t>
+            </a:r>
+          </a:p>
+        </p:txBody>
+      </p:sp>
       <p:cxnSp>
         <p:nvCxnSpPr>
           <p:cNvPr id="52" name="Straight Arrow Connector 51"/>
@@ -5269,7 +5155,7 @@
         </p:nvCxnSpPr>
         <p:spPr>
           <a:xfrm>
-            <a:off x="7043991" y="3182839"/>
+            <a:off x="7256650" y="3182839"/>
             <a:ext cx="1470216" cy="0"/>
           </a:xfrm>
           <a:prstGeom prst="straightConnector1">
@@ -5313,7 +5199,7 @@
         </p:nvCxnSpPr>
         <p:spPr>
           <a:xfrm flipV="1">
-            <a:off x="7043991" y="3564914"/>
+            <a:off x="7256650" y="3564914"/>
             <a:ext cx="1470216" cy="6325"/>
           </a:xfrm>
           <a:prstGeom prst="straightConnector1">
@@ -5360,8 +5246,8 @@
         </p:nvCxnSpPr>
         <p:spPr>
           <a:xfrm>
-            <a:off x="5675919" y="3733799"/>
-            <a:ext cx="1296056" cy="0"/>
+            <a:off x="5158639" y="3733799"/>
+            <a:ext cx="2025995" cy="0"/>
           </a:xfrm>
           <a:prstGeom prst="straightConnector1">
             <a:avLst/>
@@ -5369,6 +5255,1239 @@
           <a:ln w="19050">
             <a:solidFill>
               <a:srgbClr val="7030A0"/>
+            </a:solidFill>
+            <a:prstDash val="sysDash"/>
+            <a:headEnd type="arrow" w="med" len="med"/>
+            <a:tailEnd type="none" w="med" len="med"/>
+          </a:ln>
+        </p:spPr>
+        <p:style>
+          <a:lnRef idx="1">
+            <a:schemeClr val="accent1"/>
+          </a:lnRef>
+          <a:fillRef idx="0">
+            <a:schemeClr val="accent1"/>
+          </a:fillRef>
+          <a:effectRef idx="0">
+            <a:schemeClr val="accent1"/>
+          </a:effectRef>
+          <a:fontRef idx="minor">
+            <a:schemeClr val="tx1"/>
+          </a:fontRef>
+        </p:style>
+      </p:cxnSp>
+      <p:sp>
+        <p:nvSpPr>
+          <p:cNvPr id="98" name="Rectangle 62">
+            <a:extLst>
+              <a:ext uri="{FF2B5EF4-FFF2-40B4-BE49-F238E27FC236}">
+                <a16:creationId xmlns:a16="http://schemas.microsoft.com/office/drawing/2014/main" id="{2B997070-3436-4436-84E2-A3B09EF562A4}"/>
+              </a:ext>
+            </a:extLst>
+          </p:cNvPr>
+          <p:cNvSpPr/>
+          <p:nvPr/>
+        </p:nvSpPr>
+        <p:spPr>
+          <a:xfrm>
+            <a:off x="883145" y="4460730"/>
+            <a:ext cx="1455629" cy="346760"/>
+          </a:xfrm>
+          <a:prstGeom prst="rect">
+            <a:avLst/>
+          </a:prstGeom>
+          <a:solidFill>
+            <a:srgbClr val="0070C0"/>
+          </a:solidFill>
+          <a:ln w="19050">
+            <a:solidFill>
+              <a:srgbClr val="0070C0"/>
+            </a:solidFill>
+          </a:ln>
+          <a:effectLst/>
+        </p:spPr>
+        <p:style>
+          <a:lnRef idx="1">
+            <a:schemeClr val="accent2"/>
+          </a:lnRef>
+          <a:fillRef idx="2">
+            <a:schemeClr val="accent2"/>
+          </a:fillRef>
+          <a:effectRef idx="1">
+            <a:schemeClr val="accent2"/>
+          </a:effectRef>
+          <a:fontRef idx="minor">
+            <a:schemeClr val="dk1"/>
+          </a:fontRef>
+        </p:style>
+        <p:txBody>
+          <a:bodyPr rtlCol="0" anchor="ctr"/>
+          <a:lstStyle/>
+          <a:p>
+            <a:pPr algn="ctr"/>
+            <a:r>
+              <a:rPr lang="en-US" sz="1600" dirty="0">
+                <a:solidFill>
+                  <a:schemeClr val="bg1"/>
+                </a:solidFill>
+              </a:rPr>
+              <a:t>:</a:t>
+            </a:r>
+            <a:r>
+              <a:rPr lang="en-US" sz="1600" dirty="0" err="1">
+                <a:solidFill>
+                  <a:schemeClr val="bg1"/>
+                </a:solidFill>
+              </a:rPr>
+              <a:t>LogicManager</a:t>
+            </a:r>
+            <a:endParaRPr lang="en-SG" sz="1600" dirty="0">
+              <a:solidFill>
+                <a:schemeClr val="bg1"/>
+              </a:solidFill>
+            </a:endParaRPr>
+          </a:p>
+        </p:txBody>
+      </p:sp>
+      <p:cxnSp>
+        <p:nvCxnSpPr>
+          <p:cNvPr id="99" name="Straight Connector 98">
+            <a:extLst>
+              <a:ext uri="{FF2B5EF4-FFF2-40B4-BE49-F238E27FC236}">
+                <a16:creationId xmlns:a16="http://schemas.microsoft.com/office/drawing/2014/main" id="{03F18E06-18C7-4D6C-AD01-8269DEF70CD1}"/>
+              </a:ext>
+            </a:extLst>
+          </p:cNvPr>
+          <p:cNvCxnSpPr>
+            <a:cxnSpLocks/>
+          </p:cNvCxnSpPr>
+          <p:nvPr/>
+        </p:nvCxnSpPr>
+        <p:spPr>
+          <a:xfrm>
+            <a:off x="1610959" y="4824401"/>
+            <a:ext cx="0" cy="3481399"/>
+          </a:xfrm>
+          <a:prstGeom prst="line">
+            <a:avLst/>
+          </a:prstGeom>
+          <a:ln w="19050">
+            <a:solidFill>
+              <a:srgbClr val="0070C0"/>
+            </a:solidFill>
+            <a:prstDash val="sysDash"/>
+          </a:ln>
+          <a:effectLst/>
+        </p:spPr>
+        <p:style>
+          <a:lnRef idx="1">
+            <a:schemeClr val="accent1"/>
+          </a:lnRef>
+          <a:fillRef idx="2">
+            <a:schemeClr val="accent1"/>
+          </a:fillRef>
+          <a:effectRef idx="1">
+            <a:schemeClr val="accent1"/>
+          </a:effectRef>
+          <a:fontRef idx="minor">
+            <a:schemeClr val="dk1"/>
+          </a:fontRef>
+        </p:style>
+      </p:cxnSp>
+      <p:sp>
+        <p:nvSpPr>
+          <p:cNvPr id="100" name="Rectangle 99">
+            <a:extLst>
+              <a:ext uri="{FF2B5EF4-FFF2-40B4-BE49-F238E27FC236}">
+                <a16:creationId xmlns:a16="http://schemas.microsoft.com/office/drawing/2014/main" id="{AC83857E-58A0-4707-BEE5-04D7162579B6}"/>
+              </a:ext>
+            </a:extLst>
+          </p:cNvPr>
+          <p:cNvSpPr/>
+          <p:nvPr/>
+        </p:nvSpPr>
+        <p:spPr>
+          <a:xfrm>
+            <a:off x="1538951" y="5175095"/>
+            <a:ext cx="152400" cy="2932689"/>
+          </a:xfrm>
+          <a:prstGeom prst="rect">
+            <a:avLst/>
+          </a:prstGeom>
+          <a:solidFill>
+            <a:srgbClr val="0070C0"/>
+          </a:solidFill>
+          <a:ln>
+            <a:solidFill>
+              <a:srgbClr val="0070C0"/>
+            </a:solidFill>
+          </a:ln>
+          <a:effectLst/>
+        </p:spPr>
+        <p:style>
+          <a:lnRef idx="1">
+            <a:schemeClr val="accent3"/>
+          </a:lnRef>
+          <a:fillRef idx="2">
+            <a:schemeClr val="accent3"/>
+          </a:fillRef>
+          <a:effectRef idx="1">
+            <a:schemeClr val="accent3"/>
+          </a:effectRef>
+          <a:fontRef idx="minor">
+            <a:schemeClr val="dk1"/>
+          </a:fontRef>
+        </p:style>
+        <p:txBody>
+          <a:bodyPr rtlCol="0" anchor="ctr"/>
+          <a:lstStyle/>
+          <a:p>
+            <a:pPr algn="ctr"/>
+            <a:endParaRPr lang="en-SG" sz="1400"/>
+          </a:p>
+        </p:txBody>
+      </p:sp>
+      <p:sp>
+        <p:nvSpPr>
+          <p:cNvPr id="101" name="Rectangle 62">
+            <a:extLst>
+              <a:ext uri="{FF2B5EF4-FFF2-40B4-BE49-F238E27FC236}">
+                <a16:creationId xmlns:a16="http://schemas.microsoft.com/office/drawing/2014/main" id="{08A09C01-7D93-4601-8D3F-9810BDDB5920}"/>
+              </a:ext>
+            </a:extLst>
+          </p:cNvPr>
+          <p:cNvSpPr/>
+          <p:nvPr/>
+        </p:nvSpPr>
+        <p:spPr>
+          <a:xfrm>
+            <a:off x="3437188" y="4339806"/>
+            <a:ext cx="1219200" cy="467684"/>
+          </a:xfrm>
+          <a:prstGeom prst="rect">
+            <a:avLst/>
+          </a:prstGeom>
+          <a:solidFill>
+            <a:srgbClr val="0070C0"/>
+          </a:solidFill>
+          <a:ln w="19050">
+            <a:solidFill>
+              <a:srgbClr val="0070C0"/>
+            </a:solidFill>
+          </a:ln>
+          <a:effectLst/>
+        </p:spPr>
+        <p:style>
+          <a:lnRef idx="1">
+            <a:schemeClr val="accent2"/>
+          </a:lnRef>
+          <a:fillRef idx="2">
+            <a:schemeClr val="accent2"/>
+          </a:fillRef>
+          <a:effectRef idx="1">
+            <a:schemeClr val="accent2"/>
+          </a:effectRef>
+          <a:fontRef idx="minor">
+            <a:schemeClr val="dk1"/>
+          </a:fontRef>
+        </p:style>
+        <p:txBody>
+          <a:bodyPr rtlCol="0" anchor="ctr"/>
+          <a:lstStyle/>
+          <a:p>
+            <a:pPr algn="ctr"/>
+            <a:r>
+              <a:rPr lang="en-US" sz="1600" dirty="0">
+                <a:solidFill>
+                  <a:schemeClr val="bg1"/>
+                </a:solidFill>
+              </a:rPr>
+              <a:t>:Address</a:t>
+            </a:r>
+          </a:p>
+          <a:p>
+            <a:pPr algn="ctr"/>
+            <a:r>
+              <a:rPr lang="en-US" sz="1600" dirty="0" err="1">
+                <a:solidFill>
+                  <a:schemeClr val="bg1"/>
+                </a:solidFill>
+              </a:rPr>
+              <a:t>BookParser</a:t>
+            </a:r>
+            <a:endParaRPr lang="en-SG" sz="1600" dirty="0">
+              <a:solidFill>
+                <a:schemeClr val="bg1"/>
+              </a:solidFill>
+            </a:endParaRPr>
+          </a:p>
+        </p:txBody>
+      </p:sp>
+      <p:cxnSp>
+        <p:nvCxnSpPr>
+          <p:cNvPr id="102" name="Straight Connector 101">
+            <a:extLst>
+              <a:ext uri="{FF2B5EF4-FFF2-40B4-BE49-F238E27FC236}">
+                <a16:creationId xmlns:a16="http://schemas.microsoft.com/office/drawing/2014/main" id="{B25D69C3-E694-4922-BC20-AE44CAE44799}"/>
+              </a:ext>
+            </a:extLst>
+          </p:cNvPr>
+          <p:cNvCxnSpPr>
+            <a:cxnSpLocks/>
+          </p:cNvCxnSpPr>
+          <p:nvPr/>
+        </p:nvCxnSpPr>
+        <p:spPr>
+          <a:xfrm>
+            <a:off x="3956199" y="4824401"/>
+            <a:ext cx="0" cy="1482984"/>
+          </a:xfrm>
+          <a:prstGeom prst="line">
+            <a:avLst/>
+          </a:prstGeom>
+          <a:ln w="19050">
+            <a:solidFill>
+              <a:srgbClr val="0070C0"/>
+            </a:solidFill>
+            <a:prstDash val="sysDash"/>
+          </a:ln>
+          <a:effectLst/>
+        </p:spPr>
+        <p:style>
+          <a:lnRef idx="1">
+            <a:schemeClr val="accent1"/>
+          </a:lnRef>
+          <a:fillRef idx="2">
+            <a:schemeClr val="accent1"/>
+          </a:fillRef>
+          <a:effectRef idx="1">
+            <a:schemeClr val="accent1"/>
+          </a:effectRef>
+          <a:fontRef idx="minor">
+            <a:schemeClr val="dk1"/>
+          </a:fontRef>
+        </p:style>
+      </p:cxnSp>
+      <p:sp>
+        <p:nvSpPr>
+          <p:cNvPr id="103" name="Rectangle 102">
+            <a:extLst>
+              <a:ext uri="{FF2B5EF4-FFF2-40B4-BE49-F238E27FC236}">
+                <a16:creationId xmlns:a16="http://schemas.microsoft.com/office/drawing/2014/main" id="{D55BC24D-356C-4BE1-BC65-14AC9DF018D3}"/>
+              </a:ext>
+            </a:extLst>
+          </p:cNvPr>
+          <p:cNvSpPr/>
+          <p:nvPr/>
+        </p:nvSpPr>
+        <p:spPr>
+          <a:xfrm>
+            <a:off x="3884192" y="5254520"/>
+            <a:ext cx="191760" cy="795864"/>
+          </a:xfrm>
+          <a:prstGeom prst="rect">
+            <a:avLst/>
+          </a:prstGeom>
+          <a:solidFill>
+            <a:srgbClr val="0070C0"/>
+          </a:solidFill>
+          <a:ln>
+            <a:solidFill>
+              <a:srgbClr val="0070C0"/>
+            </a:solidFill>
+          </a:ln>
+          <a:effectLst/>
+        </p:spPr>
+        <p:style>
+          <a:lnRef idx="1">
+            <a:schemeClr val="accent3"/>
+          </a:lnRef>
+          <a:fillRef idx="2">
+            <a:schemeClr val="accent3"/>
+          </a:fillRef>
+          <a:effectRef idx="1">
+            <a:schemeClr val="accent3"/>
+          </a:effectRef>
+          <a:fontRef idx="minor">
+            <a:schemeClr val="dk1"/>
+          </a:fontRef>
+        </p:style>
+        <p:txBody>
+          <a:bodyPr rtlCol="0" anchor="ctr"/>
+          <a:lstStyle/>
+          <a:p>
+            <a:pPr algn="ctr"/>
+            <a:endParaRPr lang="en-SG" sz="1400">
+              <a:solidFill>
+                <a:schemeClr val="dk1"/>
+              </a:solidFill>
+            </a:endParaRPr>
+          </a:p>
+        </p:txBody>
+      </p:sp>
+      <p:cxnSp>
+        <p:nvCxnSpPr>
+          <p:cNvPr id="104" name="Straight Connector 103">
+            <a:extLst>
+              <a:ext uri="{FF2B5EF4-FFF2-40B4-BE49-F238E27FC236}">
+                <a16:creationId xmlns:a16="http://schemas.microsoft.com/office/drawing/2014/main" id="{B2965B5A-C68B-4A25-B785-18361F535F6B}"/>
+              </a:ext>
+            </a:extLst>
+          </p:cNvPr>
+          <p:cNvCxnSpPr>
+            <a:cxnSpLocks/>
+            <a:stCxn id="105" idx="0"/>
+          </p:cNvCxnSpPr>
+          <p:nvPr/>
+        </p:nvCxnSpPr>
+        <p:spPr>
+          <a:xfrm>
+            <a:off x="5029200" y="5621981"/>
+            <a:ext cx="17888" cy="2553014"/>
+          </a:xfrm>
+          <a:prstGeom prst="line">
+            <a:avLst/>
+          </a:prstGeom>
+          <a:ln w="19050">
+            <a:solidFill>
+              <a:srgbClr val="0070C0"/>
+            </a:solidFill>
+            <a:prstDash val="sysDash"/>
+          </a:ln>
+          <a:effectLst/>
+        </p:spPr>
+        <p:style>
+          <a:lnRef idx="1">
+            <a:schemeClr val="accent1"/>
+          </a:lnRef>
+          <a:fillRef idx="2">
+            <a:schemeClr val="accent1"/>
+          </a:fillRef>
+          <a:effectRef idx="1">
+            <a:schemeClr val="accent1"/>
+          </a:effectRef>
+          <a:fontRef idx="minor">
+            <a:schemeClr val="dk1"/>
+          </a:fontRef>
+        </p:style>
+      </p:cxnSp>
+      <p:sp>
+        <p:nvSpPr>
+          <p:cNvPr id="105" name="Rectangle 104">
+            <a:extLst>
+              <a:ext uri="{FF2B5EF4-FFF2-40B4-BE49-F238E27FC236}">
+                <a16:creationId xmlns:a16="http://schemas.microsoft.com/office/drawing/2014/main" id="{26727E4F-F9AC-4D12-ACED-F419938DC059}"/>
+              </a:ext>
+            </a:extLst>
+          </p:cNvPr>
+          <p:cNvSpPr/>
+          <p:nvPr/>
+        </p:nvSpPr>
+        <p:spPr>
+          <a:xfrm>
+            <a:off x="4953000" y="5621981"/>
+            <a:ext cx="152400" cy="276003"/>
+          </a:xfrm>
+          <a:prstGeom prst="rect">
+            <a:avLst/>
+          </a:prstGeom>
+          <a:solidFill>
+            <a:srgbClr val="0070C0"/>
+          </a:solidFill>
+          <a:ln>
+            <a:solidFill>
+              <a:srgbClr val="0070C0"/>
+            </a:solidFill>
+          </a:ln>
+          <a:effectLst/>
+        </p:spPr>
+        <p:style>
+          <a:lnRef idx="1">
+            <a:schemeClr val="accent3"/>
+          </a:lnRef>
+          <a:fillRef idx="2">
+            <a:schemeClr val="accent3"/>
+          </a:fillRef>
+          <a:effectRef idx="1">
+            <a:schemeClr val="accent3"/>
+          </a:effectRef>
+          <a:fontRef idx="minor">
+            <a:schemeClr val="dk1"/>
+          </a:fontRef>
+        </p:style>
+        <p:txBody>
+          <a:bodyPr rtlCol="0" anchor="ctr"/>
+          <a:lstStyle/>
+          <a:p>
+            <a:pPr algn="ctr"/>
+            <a:endParaRPr lang="en-SG" sz="1400"/>
+          </a:p>
+        </p:txBody>
+      </p:sp>
+      <p:cxnSp>
+        <p:nvCxnSpPr>
+          <p:cNvPr id="106" name="Straight Arrow Connector 105">
+            <a:extLst>
+              <a:ext uri="{FF2B5EF4-FFF2-40B4-BE49-F238E27FC236}">
+                <a16:creationId xmlns:a16="http://schemas.microsoft.com/office/drawing/2014/main" id="{E259C2A6-C138-4026-A094-7412D638FCFE}"/>
+              </a:ext>
+            </a:extLst>
+          </p:cNvPr>
+          <p:cNvCxnSpPr>
+            <a:cxnSpLocks/>
+          </p:cNvCxnSpPr>
+          <p:nvPr/>
+        </p:nvCxnSpPr>
+        <p:spPr>
+          <a:xfrm>
+            <a:off x="419100" y="5178783"/>
+            <a:ext cx="1119851" cy="0"/>
+          </a:xfrm>
+          <a:prstGeom prst="straightConnector1">
+            <a:avLst/>
+          </a:prstGeom>
+          <a:ln w="19050">
+            <a:solidFill>
+              <a:srgbClr val="00B050"/>
+            </a:solidFill>
+            <a:tailEnd type="arrow"/>
+          </a:ln>
+        </p:spPr>
+        <p:style>
+          <a:lnRef idx="1">
+            <a:schemeClr val="accent1"/>
+          </a:lnRef>
+          <a:fillRef idx="0">
+            <a:schemeClr val="accent1"/>
+          </a:fillRef>
+          <a:effectRef idx="0">
+            <a:schemeClr val="accent1"/>
+          </a:effectRef>
+          <a:fontRef idx="minor">
+            <a:schemeClr val="tx1"/>
+          </a:fontRef>
+        </p:style>
+      </p:cxnSp>
+      <p:sp>
+        <p:nvSpPr>
+          <p:cNvPr id="107" name="TextBox 106">
+            <a:extLst>
+              <a:ext uri="{FF2B5EF4-FFF2-40B4-BE49-F238E27FC236}">
+                <a16:creationId xmlns:a16="http://schemas.microsoft.com/office/drawing/2014/main" id="{8423F20A-2AE1-4BEA-84DF-E03B809B8764}"/>
+              </a:ext>
+            </a:extLst>
+          </p:cNvPr>
+          <p:cNvSpPr txBox="1"/>
+          <p:nvPr/>
+        </p:nvSpPr>
+        <p:spPr>
+          <a:xfrm>
+            <a:off x="-152400" y="4874818"/>
+            <a:ext cx="1729694" cy="215444"/>
+          </a:xfrm>
+          <a:prstGeom prst="rect">
+            <a:avLst/>
+          </a:prstGeom>
+          <a:noFill/>
+        </p:spPr>
+        <p:txBody>
+          <a:bodyPr wrap="square" lIns="0" tIns="0" rIns="0" bIns="0" rtlCol="0">
+            <a:spAutoFit/>
+          </a:bodyPr>
+          <a:lstStyle/>
+          <a:p>
+            <a:pPr algn="r"/>
+            <a:r>
+              <a:rPr lang="en-US" sz="1400" dirty="0">
+                <a:solidFill>
+                  <a:srgbClr val="0070C0"/>
+                </a:solidFill>
+              </a:rPr>
+              <a:t>execute(“</a:t>
+            </a:r>
+            <a:r>
+              <a:rPr lang="en-US" sz="1400" dirty="0" err="1">
+                <a:solidFill>
+                  <a:srgbClr val="0070C0"/>
+                </a:solidFill>
+              </a:rPr>
+              <a:t>viewmh</a:t>
+            </a:r>
+            <a:r>
+              <a:rPr lang="en-US" sz="1400" dirty="0">
+                <a:solidFill>
+                  <a:srgbClr val="0070C0"/>
+                </a:solidFill>
+              </a:rPr>
+              <a:t> …”)</a:t>
+            </a:r>
+          </a:p>
+        </p:txBody>
+      </p:sp>
+      <p:cxnSp>
+        <p:nvCxnSpPr>
+          <p:cNvPr id="108" name="Straight Arrow Connector 107">
+            <a:extLst>
+              <a:ext uri="{FF2B5EF4-FFF2-40B4-BE49-F238E27FC236}">
+                <a16:creationId xmlns:a16="http://schemas.microsoft.com/office/drawing/2014/main" id="{66D947A5-06C7-4975-AF12-D4C19D91A995}"/>
+              </a:ext>
+            </a:extLst>
+          </p:cNvPr>
+          <p:cNvCxnSpPr>
+            <a:cxnSpLocks/>
+          </p:cNvCxnSpPr>
+          <p:nvPr/>
+        </p:nvCxnSpPr>
+        <p:spPr>
+          <a:xfrm>
+            <a:off x="4036590" y="5417721"/>
+            <a:ext cx="1021774" cy="11404"/>
+          </a:xfrm>
+          <a:prstGeom prst="straightConnector1">
+            <a:avLst/>
+          </a:prstGeom>
+          <a:ln w="19050">
+            <a:solidFill>
+              <a:srgbClr val="0070C0"/>
+            </a:solidFill>
+            <a:tailEnd type="arrow"/>
+          </a:ln>
+        </p:spPr>
+        <p:style>
+          <a:lnRef idx="1">
+            <a:schemeClr val="accent1"/>
+          </a:lnRef>
+          <a:fillRef idx="0">
+            <a:schemeClr val="accent1"/>
+          </a:fillRef>
+          <a:effectRef idx="0">
+            <a:schemeClr val="accent1"/>
+          </a:effectRef>
+          <a:fontRef idx="minor">
+            <a:schemeClr val="tx1"/>
+          </a:fontRef>
+        </p:style>
+      </p:cxnSp>
+      <p:sp>
+        <p:nvSpPr>
+          <p:cNvPr id="109" name="TextBox 108">
+            <a:extLst>
+              <a:ext uri="{FF2B5EF4-FFF2-40B4-BE49-F238E27FC236}">
+                <a16:creationId xmlns:a16="http://schemas.microsoft.com/office/drawing/2014/main" id="{7CF58B61-0298-4381-BCE2-D748E52D35F5}"/>
+              </a:ext>
+            </a:extLst>
+          </p:cNvPr>
+          <p:cNvSpPr txBox="1"/>
+          <p:nvPr/>
+        </p:nvSpPr>
+        <p:spPr>
+          <a:xfrm>
+            <a:off x="2192191" y="6400855"/>
+            <a:ext cx="855809" cy="215444"/>
+          </a:xfrm>
+          <a:prstGeom prst="rect">
+            <a:avLst/>
+          </a:prstGeom>
+          <a:noFill/>
+        </p:spPr>
+        <p:txBody>
+          <a:bodyPr wrap="square" lIns="0" tIns="0" rIns="0" bIns="0" rtlCol="0">
+            <a:spAutoFit/>
+          </a:bodyPr>
+          <a:lstStyle>
+            <a:defPPr>
+              <a:defRPr lang="en-US"/>
+            </a:defPPr>
+            <a:lvl1pPr algn="r">
+              <a:defRPr sz="1400">
+                <a:solidFill>
+                  <a:srgbClr val="0070C0"/>
+                </a:solidFill>
+              </a:defRPr>
+            </a:lvl1pPr>
+          </a:lstStyle>
+          <a:p>
+            <a:r>
+              <a:rPr lang="en-US" dirty="0"/>
+              <a:t>execute()</a:t>
+            </a:r>
+          </a:p>
+        </p:txBody>
+      </p:sp>
+      <p:cxnSp>
+        <p:nvCxnSpPr>
+          <p:cNvPr id="110" name="Straight Arrow Connector 109">
+            <a:extLst>
+              <a:ext uri="{FF2B5EF4-FFF2-40B4-BE49-F238E27FC236}">
+                <a16:creationId xmlns:a16="http://schemas.microsoft.com/office/drawing/2014/main" id="{1FF05E46-7D47-448A-BFA7-491155F0E349}"/>
+              </a:ext>
+            </a:extLst>
+          </p:cNvPr>
+          <p:cNvCxnSpPr>
+            <a:cxnSpLocks/>
+          </p:cNvCxnSpPr>
+          <p:nvPr/>
+        </p:nvCxnSpPr>
+        <p:spPr>
+          <a:xfrm>
+            <a:off x="4109108" y="5795016"/>
+            <a:ext cx="843892" cy="11404"/>
+          </a:xfrm>
+          <a:prstGeom prst="straightConnector1">
+            <a:avLst/>
+          </a:prstGeom>
+          <a:ln w="19050">
+            <a:solidFill>
+              <a:srgbClr val="0070C0"/>
+            </a:solidFill>
+            <a:prstDash val="sysDash"/>
+            <a:headEnd type="arrow" w="med" len="med"/>
+            <a:tailEnd type="none" w="med" len="med"/>
+          </a:ln>
+        </p:spPr>
+        <p:style>
+          <a:lnRef idx="1">
+            <a:schemeClr val="accent1"/>
+          </a:lnRef>
+          <a:fillRef idx="0">
+            <a:schemeClr val="accent1"/>
+          </a:fillRef>
+          <a:effectRef idx="0">
+            <a:schemeClr val="accent1"/>
+          </a:effectRef>
+          <a:fontRef idx="minor">
+            <a:schemeClr val="tx1"/>
+          </a:fontRef>
+        </p:style>
+      </p:cxnSp>
+      <p:cxnSp>
+        <p:nvCxnSpPr>
+          <p:cNvPr id="111" name="Straight Arrow Connector 110">
+            <a:extLst>
+              <a:ext uri="{FF2B5EF4-FFF2-40B4-BE49-F238E27FC236}">
+                <a16:creationId xmlns:a16="http://schemas.microsoft.com/office/drawing/2014/main" id="{E584D855-3307-4716-878C-C5D76BE5746E}"/>
+              </a:ext>
+            </a:extLst>
+          </p:cNvPr>
+          <p:cNvCxnSpPr>
+            <a:cxnSpLocks/>
+          </p:cNvCxnSpPr>
+          <p:nvPr/>
+        </p:nvCxnSpPr>
+        <p:spPr>
+          <a:xfrm>
+            <a:off x="1691351" y="5897984"/>
+            <a:ext cx="2104508" cy="0"/>
+          </a:xfrm>
+          <a:prstGeom prst="straightConnector1">
+            <a:avLst/>
+          </a:prstGeom>
+          <a:ln w="19050">
+            <a:solidFill>
+              <a:srgbClr val="0070C0"/>
+            </a:solidFill>
+            <a:prstDash val="sysDash"/>
+            <a:headEnd type="arrow" w="med" len="med"/>
+            <a:tailEnd type="none" w="med" len="med"/>
+          </a:ln>
+        </p:spPr>
+        <p:style>
+          <a:lnRef idx="1">
+            <a:schemeClr val="accent1"/>
+          </a:lnRef>
+          <a:fillRef idx="0">
+            <a:schemeClr val="accent1"/>
+          </a:fillRef>
+          <a:effectRef idx="0">
+            <a:schemeClr val="accent1"/>
+          </a:effectRef>
+          <a:fontRef idx="minor">
+            <a:schemeClr val="tx1"/>
+          </a:fontRef>
+        </p:style>
+      </p:cxnSp>
+      <p:cxnSp>
+        <p:nvCxnSpPr>
+          <p:cNvPr id="112" name="Straight Arrow Connector 111">
+            <a:extLst>
+              <a:ext uri="{FF2B5EF4-FFF2-40B4-BE49-F238E27FC236}">
+                <a16:creationId xmlns:a16="http://schemas.microsoft.com/office/drawing/2014/main" id="{CDF246C0-798E-4791-9D8A-4DB26191CF6B}"/>
+              </a:ext>
+            </a:extLst>
+          </p:cNvPr>
+          <p:cNvCxnSpPr>
+            <a:cxnSpLocks/>
+          </p:cNvCxnSpPr>
+          <p:nvPr/>
+        </p:nvCxnSpPr>
+        <p:spPr>
+          <a:xfrm>
+            <a:off x="380999" y="8107784"/>
+            <a:ext cx="1196051" cy="0"/>
+          </a:xfrm>
+          <a:prstGeom prst="straightConnector1">
+            <a:avLst/>
+          </a:prstGeom>
+          <a:ln w="19050">
+            <a:solidFill>
+              <a:schemeClr val="accent1"/>
+            </a:solidFill>
+            <a:prstDash val="sysDash"/>
+            <a:headEnd type="arrow" w="med" len="med"/>
+            <a:tailEnd type="none" w="med" len="med"/>
+          </a:ln>
+        </p:spPr>
+        <p:style>
+          <a:lnRef idx="1">
+            <a:schemeClr val="accent1"/>
+          </a:lnRef>
+          <a:fillRef idx="0">
+            <a:schemeClr val="accent1"/>
+          </a:fillRef>
+          <a:effectRef idx="0">
+            <a:schemeClr val="accent1"/>
+          </a:effectRef>
+          <a:fontRef idx="minor">
+            <a:schemeClr val="tx1"/>
+          </a:fontRef>
+        </p:style>
+      </p:cxnSp>
+      <p:sp>
+        <p:nvSpPr>
+          <p:cNvPr id="113" name="Rectangle 112">
+            <a:extLst>
+              <a:ext uri="{FF2B5EF4-FFF2-40B4-BE49-F238E27FC236}">
+                <a16:creationId xmlns:a16="http://schemas.microsoft.com/office/drawing/2014/main" id="{60817F70-DA81-4CAD-934B-DE9875CF138A}"/>
+              </a:ext>
+            </a:extLst>
+          </p:cNvPr>
+          <p:cNvSpPr/>
+          <p:nvPr/>
+        </p:nvSpPr>
+        <p:spPr>
+          <a:xfrm>
+            <a:off x="4953000" y="6570091"/>
+            <a:ext cx="207694" cy="1385292"/>
+          </a:xfrm>
+          <a:prstGeom prst="rect">
+            <a:avLst/>
+          </a:prstGeom>
+          <a:solidFill>
+            <a:srgbClr val="0070C0"/>
+          </a:solidFill>
+          <a:ln>
+            <a:solidFill>
+              <a:srgbClr val="0070C0"/>
+            </a:solidFill>
+          </a:ln>
+          <a:effectLst/>
+        </p:spPr>
+        <p:style>
+          <a:lnRef idx="1">
+            <a:schemeClr val="accent3"/>
+          </a:lnRef>
+          <a:fillRef idx="2">
+            <a:schemeClr val="accent3"/>
+          </a:fillRef>
+          <a:effectRef idx="1">
+            <a:schemeClr val="accent3"/>
+          </a:effectRef>
+          <a:fontRef idx="minor">
+            <a:schemeClr val="dk1"/>
+          </a:fontRef>
+        </p:style>
+        <p:txBody>
+          <a:bodyPr rtlCol="0" anchor="ctr"/>
+          <a:lstStyle/>
+          <a:p>
+            <a:pPr algn="ctr"/>
+            <a:endParaRPr lang="en-SG" sz="1400"/>
+          </a:p>
+        </p:txBody>
+      </p:sp>
+      <p:sp>
+        <p:nvSpPr>
+          <p:cNvPr id="115" name="TextBox 114">
+            <a:extLst>
+              <a:ext uri="{FF2B5EF4-FFF2-40B4-BE49-F238E27FC236}">
+                <a16:creationId xmlns:a16="http://schemas.microsoft.com/office/drawing/2014/main" id="{3AE38CF7-CC94-4F03-A5F4-17524D59C06E}"/>
+              </a:ext>
+            </a:extLst>
+          </p:cNvPr>
+          <p:cNvSpPr txBox="1"/>
+          <p:nvPr/>
+        </p:nvSpPr>
+        <p:spPr>
+          <a:xfrm>
+            <a:off x="1447800" y="5022935"/>
+            <a:ext cx="2348059" cy="215444"/>
+          </a:xfrm>
+          <a:prstGeom prst="rect">
+            <a:avLst/>
+          </a:prstGeom>
+          <a:noFill/>
+        </p:spPr>
+        <p:txBody>
+          <a:bodyPr wrap="square" lIns="0" tIns="0" rIns="0" bIns="0" rtlCol="0">
+            <a:spAutoFit/>
+          </a:bodyPr>
+          <a:lstStyle>
+            <a:defPPr>
+              <a:defRPr lang="en-US"/>
+            </a:defPPr>
+            <a:lvl1pPr algn="r">
+              <a:defRPr sz="1400">
+                <a:solidFill>
+                  <a:srgbClr val="0070C0"/>
+                </a:solidFill>
+              </a:defRPr>
+            </a:lvl1pPr>
+          </a:lstStyle>
+          <a:p>
+            <a:r>
+              <a:rPr lang="en-US" dirty="0" err="1"/>
+              <a:t>parseCommand</a:t>
+            </a:r>
+            <a:r>
+              <a:rPr lang="en-US" dirty="0"/>
+              <a:t>(“</a:t>
+            </a:r>
+            <a:r>
+              <a:rPr lang="en-US" dirty="0" err="1"/>
+              <a:t>viewmh</a:t>
+            </a:r>
+            <a:r>
+              <a:rPr lang="en-US" dirty="0"/>
+              <a:t> …”)</a:t>
+            </a:r>
+          </a:p>
+        </p:txBody>
+      </p:sp>
+      <p:sp>
+        <p:nvSpPr>
+          <p:cNvPr id="116" name="TextBox 115">
+            <a:extLst>
+              <a:ext uri="{FF2B5EF4-FFF2-40B4-BE49-F238E27FC236}">
+                <a16:creationId xmlns:a16="http://schemas.microsoft.com/office/drawing/2014/main" id="{487100C0-D22D-45FE-9BF7-17B856301214}"/>
+              </a:ext>
+            </a:extLst>
+          </p:cNvPr>
+          <p:cNvSpPr txBox="1"/>
+          <p:nvPr/>
+        </p:nvSpPr>
+        <p:spPr>
+          <a:xfrm>
+            <a:off x="2133600" y="7707860"/>
+            <a:ext cx="621216" cy="215444"/>
+          </a:xfrm>
+          <a:prstGeom prst="rect">
+            <a:avLst/>
+          </a:prstGeom>
+          <a:noFill/>
+        </p:spPr>
+        <p:txBody>
+          <a:bodyPr wrap="square" lIns="0" tIns="0" rIns="0" bIns="0" rtlCol="0">
+            <a:spAutoFit/>
+          </a:bodyPr>
+          <a:lstStyle>
+            <a:defPPr>
+              <a:defRPr lang="en-US"/>
+            </a:defPPr>
+            <a:lvl1pPr algn="r">
+              <a:defRPr sz="1400">
+                <a:solidFill>
+                  <a:srgbClr val="0070C0"/>
+                </a:solidFill>
+              </a:defRPr>
+            </a:lvl1pPr>
+          </a:lstStyle>
+          <a:p>
+            <a:r>
+              <a:rPr lang="en-US" dirty="0"/>
+              <a:t>result</a:t>
+            </a:r>
+          </a:p>
+        </p:txBody>
+      </p:sp>
+      <p:sp>
+        <p:nvSpPr>
+          <p:cNvPr id="117" name="TextBox 116">
+            <a:extLst>
+              <a:ext uri="{FF2B5EF4-FFF2-40B4-BE49-F238E27FC236}">
+                <a16:creationId xmlns:a16="http://schemas.microsoft.com/office/drawing/2014/main" id="{06223681-3035-46DF-9B43-DB7FD51EE452}"/>
+              </a:ext>
+            </a:extLst>
+          </p:cNvPr>
+          <p:cNvSpPr txBox="1"/>
+          <p:nvPr/>
+        </p:nvSpPr>
+        <p:spPr>
+          <a:xfrm>
+            <a:off x="645270" y="7862685"/>
+            <a:ext cx="762000" cy="215444"/>
+          </a:xfrm>
+          <a:prstGeom prst="rect">
+            <a:avLst/>
+          </a:prstGeom>
+          <a:noFill/>
+        </p:spPr>
+        <p:txBody>
+          <a:bodyPr wrap="square" lIns="0" tIns="0" rIns="0" bIns="0" rtlCol="0">
+            <a:spAutoFit/>
+          </a:bodyPr>
+          <a:lstStyle>
+            <a:defPPr>
+              <a:defRPr lang="en-US"/>
+            </a:defPPr>
+            <a:lvl1pPr algn="r">
+              <a:defRPr sz="1400">
+                <a:solidFill>
+                  <a:srgbClr val="0070C0"/>
+                </a:solidFill>
+              </a:defRPr>
+            </a:lvl1pPr>
+          </a:lstStyle>
+          <a:p>
+            <a:r>
+              <a:rPr lang="en-US" dirty="0"/>
+              <a:t>result</a:t>
+            </a:r>
+          </a:p>
+        </p:txBody>
+      </p:sp>
+      <p:sp>
+        <p:nvSpPr>
+          <p:cNvPr id="120" name="TextBox 119">
+            <a:extLst>
+              <a:ext uri="{FF2B5EF4-FFF2-40B4-BE49-F238E27FC236}">
+                <a16:creationId xmlns:a16="http://schemas.microsoft.com/office/drawing/2014/main" id="{F1804482-EC0E-4601-B665-98D096542A45}"/>
+              </a:ext>
+            </a:extLst>
+          </p:cNvPr>
+          <p:cNvSpPr txBox="1"/>
+          <p:nvPr/>
+        </p:nvSpPr>
+        <p:spPr>
+          <a:xfrm>
+            <a:off x="2590800" y="5669384"/>
+            <a:ext cx="220343" cy="215444"/>
+          </a:xfrm>
+          <a:prstGeom prst="rect">
+            <a:avLst/>
+          </a:prstGeom>
+          <a:noFill/>
+        </p:spPr>
+        <p:txBody>
+          <a:bodyPr wrap="square" lIns="0" tIns="0" rIns="0" bIns="0" rtlCol="0">
+            <a:spAutoFit/>
+          </a:bodyPr>
+          <a:lstStyle>
+            <a:defPPr>
+              <a:defRPr lang="en-US"/>
+            </a:defPPr>
+            <a:lvl1pPr algn="r">
+              <a:defRPr sz="1400">
+                <a:solidFill>
+                  <a:srgbClr val="0070C0"/>
+                </a:solidFill>
+              </a:defRPr>
+            </a:lvl1pPr>
+          </a:lstStyle>
+          <a:p>
+            <a:r>
+              <a:rPr lang="en-US" dirty="0"/>
+              <a:t>v</a:t>
+            </a:r>
+          </a:p>
+        </p:txBody>
+      </p:sp>
+      <p:sp>
+        <p:nvSpPr>
+          <p:cNvPr id="125" name="Rectangle 62">
+            <a:extLst>
+              <a:ext uri="{FF2B5EF4-FFF2-40B4-BE49-F238E27FC236}">
+                <a16:creationId xmlns:a16="http://schemas.microsoft.com/office/drawing/2014/main" id="{DA884A26-36B5-4C78-8F1E-BB5FB7108430}"/>
+              </a:ext>
+            </a:extLst>
+          </p:cNvPr>
+          <p:cNvSpPr/>
+          <p:nvPr/>
+        </p:nvSpPr>
+        <p:spPr>
+          <a:xfrm>
+            <a:off x="5035977" y="5029200"/>
+            <a:ext cx="2025994" cy="462177"/>
+          </a:xfrm>
+          <a:prstGeom prst="rect">
+            <a:avLst/>
+          </a:prstGeom>
+          <a:solidFill>
+            <a:srgbClr val="0070C0"/>
+          </a:solidFill>
+          <a:ln w="19050">
+            <a:solidFill>
+              <a:srgbClr val="0070C0"/>
+            </a:solidFill>
+          </a:ln>
+          <a:effectLst/>
+        </p:spPr>
+        <p:style>
+          <a:lnRef idx="1">
+            <a:schemeClr val="accent2"/>
+          </a:lnRef>
+          <a:fillRef idx="2">
+            <a:schemeClr val="accent2"/>
+          </a:fillRef>
+          <a:effectRef idx="1">
+            <a:schemeClr val="accent2"/>
+          </a:effectRef>
+          <a:fontRef idx="minor">
+            <a:schemeClr val="dk1"/>
+          </a:fontRef>
+        </p:style>
+        <p:txBody>
+          <a:bodyPr rtlCol="0" anchor="ctr"/>
+          <a:lstStyle/>
+          <a:p>
+            <a:pPr algn="ctr"/>
+            <a:r>
+              <a:rPr lang="en-US" sz="1600" dirty="0">
+                <a:solidFill>
+                  <a:schemeClr val="bg1"/>
+                </a:solidFill>
+              </a:rPr>
+              <a:t>v: </a:t>
+            </a:r>
+            <a:r>
+              <a:rPr lang="en-US" sz="1600" dirty="0" err="1">
+                <a:solidFill>
+                  <a:schemeClr val="bg1"/>
+                </a:solidFill>
+              </a:rPr>
+              <a:t>ViewmhCommand</a:t>
+            </a:r>
+            <a:endParaRPr lang="en-SG" sz="1600" dirty="0">
+              <a:solidFill>
+                <a:schemeClr val="bg1"/>
+              </a:solidFill>
+            </a:endParaRPr>
+          </a:p>
+        </p:txBody>
+      </p:sp>
+      <p:cxnSp>
+        <p:nvCxnSpPr>
+          <p:cNvPr id="126" name="Straight Arrow Connector 125">
+            <a:extLst>
+              <a:ext uri="{FF2B5EF4-FFF2-40B4-BE49-F238E27FC236}">
+                <a16:creationId xmlns:a16="http://schemas.microsoft.com/office/drawing/2014/main" id="{C3FAC0F3-56E3-4CAB-8302-7439B7CCED77}"/>
+              </a:ext>
+            </a:extLst>
+          </p:cNvPr>
+          <p:cNvCxnSpPr>
+            <a:cxnSpLocks/>
+          </p:cNvCxnSpPr>
+          <p:nvPr/>
+        </p:nvCxnSpPr>
+        <p:spPr>
+          <a:xfrm flipV="1">
+            <a:off x="1691351" y="6616299"/>
+            <a:ext cx="3251889" cy="31801"/>
+          </a:xfrm>
+          <a:prstGeom prst="straightConnector1">
+            <a:avLst/>
+          </a:prstGeom>
+          <a:ln w="19050">
+            <a:solidFill>
+              <a:srgbClr val="0070C0"/>
+            </a:solidFill>
+            <a:tailEnd type="arrow"/>
+          </a:ln>
+        </p:spPr>
+        <p:style>
+          <a:lnRef idx="1">
+            <a:schemeClr val="accent1"/>
+          </a:lnRef>
+          <a:fillRef idx="0">
+            <a:schemeClr val="accent1"/>
+          </a:fillRef>
+          <a:effectRef idx="0">
+            <a:schemeClr val="accent1"/>
+          </a:effectRef>
+          <a:fontRef idx="minor">
+            <a:schemeClr val="tx1"/>
+          </a:fontRef>
+        </p:style>
+      </p:cxnSp>
+      <p:cxnSp>
+        <p:nvCxnSpPr>
+          <p:cNvPr id="127" name="Straight Arrow Connector 126">
+            <a:extLst>
+              <a:ext uri="{FF2B5EF4-FFF2-40B4-BE49-F238E27FC236}">
+                <a16:creationId xmlns:a16="http://schemas.microsoft.com/office/drawing/2014/main" id="{B55DBEA3-593D-4747-A55C-B20C35C1D937}"/>
+              </a:ext>
+            </a:extLst>
+          </p:cNvPr>
+          <p:cNvCxnSpPr>
+            <a:cxnSpLocks/>
+          </p:cNvCxnSpPr>
+          <p:nvPr/>
+        </p:nvCxnSpPr>
+        <p:spPr>
+          <a:xfrm flipV="1">
+            <a:off x="1708245" y="5268321"/>
+            <a:ext cx="2187935" cy="12381"/>
+          </a:xfrm>
+          <a:prstGeom prst="straightConnector1">
+            <a:avLst/>
+          </a:prstGeom>
+          <a:ln w="19050">
+            <a:solidFill>
+              <a:srgbClr val="0070C0"/>
+            </a:solidFill>
+            <a:tailEnd type="arrow"/>
+          </a:ln>
+        </p:spPr>
+        <p:style>
+          <a:lnRef idx="1">
+            <a:schemeClr val="accent1"/>
+          </a:lnRef>
+          <a:fillRef idx="0">
+            <a:schemeClr val="accent1"/>
+          </a:fillRef>
+          <a:effectRef idx="0">
+            <a:schemeClr val="accent1"/>
+          </a:effectRef>
+          <a:fontRef idx="minor">
+            <a:schemeClr val="tx1"/>
+          </a:fontRef>
+        </p:style>
+      </p:cxnSp>
+      <p:cxnSp>
+        <p:nvCxnSpPr>
+          <p:cNvPr id="128" name="Straight Arrow Connector 127">
+            <a:extLst>
+              <a:ext uri="{FF2B5EF4-FFF2-40B4-BE49-F238E27FC236}">
+                <a16:creationId xmlns:a16="http://schemas.microsoft.com/office/drawing/2014/main" id="{21036E4D-258A-4920-B7F2-1DC2E39B87F5}"/>
+              </a:ext>
+            </a:extLst>
+          </p:cNvPr>
+          <p:cNvCxnSpPr>
+            <a:cxnSpLocks/>
+            <a:endCxn id="113" idx="2"/>
+          </p:cNvCxnSpPr>
+          <p:nvPr/>
+        </p:nvCxnSpPr>
+        <p:spPr>
+          <a:xfrm>
+            <a:off x="1691998" y="7953246"/>
+            <a:ext cx="3364849" cy="2137"/>
+          </a:xfrm>
+          <a:prstGeom prst="straightConnector1">
+            <a:avLst/>
+          </a:prstGeom>
+          <a:ln w="19050">
+            <a:solidFill>
+              <a:srgbClr val="0070C0"/>
             </a:solidFill>
             <a:prstDash val="sysDash"/>
             <a:headEnd type="arrow" w="med" len="med"/>

</xml_diff>

<commit_message>
Update AddmhViewmhSequenceDiagram in docs
</commit_message>
<xml_diff>
--- a/docs/diagrams/UndoRedoSequenceDiagram.pptx
+++ b/docs/diagrams/UndoRedoSequenceDiagram.pptx
@@ -208,7 +208,7 @@
           <a:p>
             <a:fld id="{F5CC4B3F-88C1-4FFA-B1B6-F41C21DC6924}" type="datetimeFigureOut">
               <a:rPr lang="en-US" smtClean="0"/>
-              <a:t>10/16/2018</a:t>
+              <a:t>10/17/2018</a:t>
             </a:fld>
             <a:endParaRPr lang="en-US"/>
           </a:p>
@@ -654,7 +654,7 @@
           <a:p>
             <a:fld id="{78C97017-6FC3-485B-9764-EAC9E56C1D49}" type="datetimeFigureOut">
               <a:rPr lang="en-US" smtClean="0"/>
-              <a:t>10/16/2018</a:t>
+              <a:t>10/17/2018</a:t>
             </a:fld>
             <a:endParaRPr lang="en-US"/>
           </a:p>
@@ -822,7 +822,7 @@
           <a:p>
             <a:fld id="{78C97017-6FC3-485B-9764-EAC9E56C1D49}" type="datetimeFigureOut">
               <a:rPr lang="en-US" smtClean="0"/>
-              <a:t>10/16/2018</a:t>
+              <a:t>10/17/2018</a:t>
             </a:fld>
             <a:endParaRPr lang="en-US"/>
           </a:p>
@@ -1000,7 +1000,7 @@
           <a:p>
             <a:fld id="{78C97017-6FC3-485B-9764-EAC9E56C1D49}" type="datetimeFigureOut">
               <a:rPr lang="en-US" smtClean="0"/>
-              <a:t>10/16/2018</a:t>
+              <a:t>10/17/2018</a:t>
             </a:fld>
             <a:endParaRPr lang="en-US"/>
           </a:p>
@@ -1168,7 +1168,7 @@
           <a:p>
             <a:fld id="{78C97017-6FC3-485B-9764-EAC9E56C1D49}" type="datetimeFigureOut">
               <a:rPr lang="en-US" smtClean="0"/>
-              <a:t>10/16/2018</a:t>
+              <a:t>10/17/2018</a:t>
             </a:fld>
             <a:endParaRPr lang="en-US"/>
           </a:p>
@@ -1413,7 +1413,7 @@
           <a:p>
             <a:fld id="{78C97017-6FC3-485B-9764-EAC9E56C1D49}" type="datetimeFigureOut">
               <a:rPr lang="en-US" smtClean="0"/>
-              <a:t>10/16/2018</a:t>
+              <a:t>10/17/2018</a:t>
             </a:fld>
             <a:endParaRPr lang="en-US"/>
           </a:p>
@@ -1698,7 +1698,7 @@
           <a:p>
             <a:fld id="{78C97017-6FC3-485B-9764-EAC9E56C1D49}" type="datetimeFigureOut">
               <a:rPr lang="en-US" smtClean="0"/>
-              <a:t>10/16/2018</a:t>
+              <a:t>10/17/2018</a:t>
             </a:fld>
             <a:endParaRPr lang="en-US"/>
           </a:p>
@@ -2117,7 +2117,7 @@
           <a:p>
             <a:fld id="{78C97017-6FC3-485B-9764-EAC9E56C1D49}" type="datetimeFigureOut">
               <a:rPr lang="en-US" smtClean="0"/>
-              <a:t>10/16/2018</a:t>
+              <a:t>10/17/2018</a:t>
             </a:fld>
             <a:endParaRPr lang="en-US"/>
           </a:p>
@@ -2234,7 +2234,7 @@
           <a:p>
             <a:fld id="{78C97017-6FC3-485B-9764-EAC9E56C1D49}" type="datetimeFigureOut">
               <a:rPr lang="en-US" smtClean="0"/>
-              <a:t>10/16/2018</a:t>
+              <a:t>10/17/2018</a:t>
             </a:fld>
             <a:endParaRPr lang="en-US"/>
           </a:p>
@@ -2329,7 +2329,7 @@
           <a:p>
             <a:fld id="{78C97017-6FC3-485B-9764-EAC9E56C1D49}" type="datetimeFigureOut">
               <a:rPr lang="en-US" smtClean="0"/>
-              <a:t>10/16/2018</a:t>
+              <a:t>10/17/2018</a:t>
             </a:fld>
             <a:endParaRPr lang="en-US"/>
           </a:p>
@@ -2604,7 +2604,7 @@
           <a:p>
             <a:fld id="{78C97017-6FC3-485B-9764-EAC9E56C1D49}" type="datetimeFigureOut">
               <a:rPr lang="en-US" smtClean="0"/>
-              <a:t>10/16/2018</a:t>
+              <a:t>10/17/2018</a:t>
             </a:fld>
             <a:endParaRPr lang="en-US"/>
           </a:p>
@@ -2856,7 +2856,7 @@
           <a:p>
             <a:fld id="{78C97017-6FC3-485B-9764-EAC9E56C1D49}" type="datetimeFigureOut">
               <a:rPr lang="en-US" smtClean="0"/>
-              <a:t>10/16/2018</a:t>
+              <a:t>10/17/2018</a:t>
             </a:fld>
             <a:endParaRPr lang="en-US"/>
           </a:p>
@@ -3067,7 +3067,7 @@
           <a:p>
             <a:fld id="{78C97017-6FC3-485B-9764-EAC9E56C1D49}" type="datetimeFigureOut">
               <a:rPr lang="en-US" smtClean="0"/>
-              <a:t>10/16/2018</a:t>
+              <a:t>10/17/2018</a:t>
             </a:fld>
             <a:endParaRPr lang="en-US"/>
           </a:p>
@@ -3450,8 +3450,8 @@
         </p:nvSpPr>
         <p:spPr>
           <a:xfrm>
-            <a:off x="6459374" y="118894"/>
-            <a:ext cx="3984805" cy="8315799"/>
+            <a:off x="5717552" y="0"/>
+            <a:ext cx="3426449" cy="6858000"/>
           </a:xfrm>
           <a:prstGeom prst="roundRect">
             <a:avLst>
@@ -3488,14 +3488,14 @@
           <a:lstStyle/>
           <a:p>
             <a:r>
-              <a:rPr lang="en-US" sz="1200" b="1" dirty="0">
+              <a:rPr lang="en-US" sz="900" b="1" dirty="0">
                 <a:solidFill>
                   <a:srgbClr val="7030A0"/>
                 </a:solidFill>
               </a:rPr>
               <a:t>Model</a:t>
             </a:r>
-            <a:endParaRPr lang="en-SG" sz="1200" b="1" dirty="0">
+            <a:endParaRPr lang="en-SG" sz="900" b="1" dirty="0">
               <a:solidFill>
                 <a:srgbClr val="7030A0"/>
               </a:solidFill>
@@ -3511,8 +3511,8 @@
         </p:nvSpPr>
         <p:spPr>
           <a:xfrm>
-            <a:off x="-152399" y="120683"/>
-            <a:ext cx="6454594" cy="8314010"/>
+            <a:off x="25402" y="1407"/>
+            <a:ext cx="5550168" cy="6856525"/>
           </a:xfrm>
           <a:prstGeom prst="roundRect">
             <a:avLst>
@@ -3549,14 +3549,14 @@
           <a:lstStyle/>
           <a:p>
             <a:r>
-              <a:rPr lang="en-US" sz="1200" b="1" dirty="0">
+              <a:rPr lang="en-US" sz="900" b="1" dirty="0">
                 <a:solidFill>
                   <a:srgbClr val="0070C0"/>
                 </a:solidFill>
               </a:rPr>
               <a:t>Logic</a:t>
             </a:r>
-            <a:endParaRPr lang="en-SG" sz="1200" b="1" dirty="0">
+            <a:endParaRPr lang="en-SG" sz="900" b="1" dirty="0">
               <a:solidFill>
                 <a:srgbClr val="0070C0"/>
               </a:solidFill>
@@ -3572,8 +3572,8 @@
         </p:nvSpPr>
         <p:spPr>
           <a:xfrm>
-            <a:off x="883145" y="543946"/>
-            <a:ext cx="1455629" cy="346760"/>
+            <a:off x="609600" y="366523"/>
+            <a:ext cx="1133675" cy="230057"/>
           </a:xfrm>
           <a:prstGeom prst="rect">
             <a:avLst/>
@@ -3608,7 +3608,7 @@
           <a:p>
             <a:pPr algn="ctr"/>
             <a:r>
-              <a:rPr lang="en-US" sz="1600" dirty="0">
+              <a:rPr lang="en-US" sz="1050" dirty="0">
                 <a:solidFill>
                   <a:schemeClr val="bg1"/>
                 </a:solidFill>
@@ -3616,14 +3616,14 @@
               <a:t>:</a:t>
             </a:r>
             <a:r>
-              <a:rPr lang="en-US" sz="1600" dirty="0" err="1">
+              <a:rPr lang="en-US" sz="1050" dirty="0" err="1">
                 <a:solidFill>
                   <a:schemeClr val="bg1"/>
                 </a:solidFill>
               </a:rPr>
               <a:t>LogicManager</a:t>
             </a:r>
-            <a:endParaRPr lang="en-SG" sz="1600" dirty="0">
+            <a:endParaRPr lang="en-SG" sz="1050" dirty="0">
               <a:solidFill>
                 <a:schemeClr val="bg1"/>
               </a:solidFill>
@@ -3641,8 +3641,8 @@
         </p:nvCxnSpPr>
         <p:spPr>
           <a:xfrm>
-            <a:off x="1610959" y="907617"/>
-            <a:ext cx="0" cy="3481399"/>
+            <a:off x="1236184" y="620284"/>
+            <a:ext cx="0" cy="3146697"/>
           </a:xfrm>
           <a:prstGeom prst="line">
             <a:avLst/>
@@ -3678,8 +3678,8 @@
         </p:nvSpPr>
         <p:spPr>
           <a:xfrm>
-            <a:off x="1538951" y="1258311"/>
-            <a:ext cx="152400" cy="2932689"/>
+            <a:off x="1174192" y="762000"/>
+            <a:ext cx="131045" cy="2418574"/>
           </a:xfrm>
           <a:prstGeom prst="rect">
             <a:avLst/>
@@ -3713,7 +3713,7 @@
           <a:lstStyle/>
           <a:p>
             <a:pPr algn="ctr"/>
-            <a:endParaRPr lang="en-SG" sz="1400"/>
+            <a:endParaRPr lang="en-SG" sz="1000"/>
           </a:p>
         </p:txBody>
       </p:sp>
@@ -3725,8 +3725,8 @@
         </p:nvSpPr>
         <p:spPr>
           <a:xfrm>
-            <a:off x="3437188" y="423022"/>
-            <a:ext cx="1219200" cy="467684"/>
+            <a:off x="2057400" y="304800"/>
+            <a:ext cx="888634" cy="357751"/>
           </a:xfrm>
           <a:prstGeom prst="rect">
             <a:avLst/>
@@ -3761,7 +3761,7 @@
           <a:p>
             <a:pPr algn="ctr"/>
             <a:r>
-              <a:rPr lang="en-US" sz="1600" dirty="0">
+              <a:rPr lang="en-US" sz="1050" dirty="0">
                 <a:solidFill>
                   <a:schemeClr val="bg1"/>
                 </a:solidFill>
@@ -3772,14 +3772,14 @@
           <a:p>
             <a:pPr algn="ctr"/>
             <a:r>
-              <a:rPr lang="en-US" sz="1600" dirty="0" err="1">
+              <a:rPr lang="en-US" sz="1050" dirty="0" err="1">
                 <a:solidFill>
                   <a:schemeClr val="bg1"/>
                 </a:solidFill>
               </a:rPr>
               <a:t>BookParser</a:t>
             </a:r>
-            <a:endParaRPr lang="en-SG" sz="1600" dirty="0">
+            <a:endParaRPr lang="en-SG" sz="1050" dirty="0">
               <a:solidFill>
                 <a:schemeClr val="bg1"/>
               </a:solidFill>
@@ -3797,8 +3797,8 @@
         </p:nvCxnSpPr>
         <p:spPr>
           <a:xfrm>
-            <a:off x="3956199" y="907617"/>
-            <a:ext cx="0" cy="1482984"/>
+            <a:off x="2590800" y="609600"/>
+            <a:ext cx="0" cy="1223010"/>
           </a:xfrm>
           <a:prstGeom prst="line">
             <a:avLst/>
@@ -3834,8 +3834,8 @@
         </p:nvSpPr>
         <p:spPr>
           <a:xfrm>
-            <a:off x="3884192" y="1337736"/>
-            <a:ext cx="191760" cy="795864"/>
+            <a:off x="2514600" y="901710"/>
+            <a:ext cx="155753" cy="1033086"/>
           </a:xfrm>
           <a:prstGeom prst="rect">
             <a:avLst/>
@@ -3869,7 +3869,7 @@
           <a:lstStyle/>
           <a:p>
             <a:pPr algn="ctr"/>
-            <a:endParaRPr lang="en-SG" sz="1400">
+            <a:endParaRPr lang="en-SG" sz="1000">
               <a:solidFill>
                 <a:schemeClr val="dk1"/>
               </a:solidFill>
@@ -3888,8 +3888,8 @@
         </p:nvCxnSpPr>
         <p:spPr>
           <a:xfrm>
-            <a:off x="5029200" y="1705197"/>
-            <a:ext cx="17888" cy="2553014"/>
+            <a:off x="4721204" y="1247533"/>
+            <a:ext cx="3286" cy="2007793"/>
           </a:xfrm>
           <a:prstGeom prst="line">
             <a:avLst/>
@@ -3925,8 +3925,8 @@
         </p:nvSpPr>
         <p:spPr>
           <a:xfrm>
-            <a:off x="4953000" y="1705197"/>
-            <a:ext cx="152400" cy="276003"/>
+            <a:off x="4643489" y="1247533"/>
+            <a:ext cx="155429" cy="428504"/>
           </a:xfrm>
           <a:prstGeom prst="rect">
             <a:avLst/>
@@ -3960,7 +3960,7 @@
           <a:lstStyle/>
           <a:p>
             <a:pPr algn="ctr"/>
-            <a:endParaRPr lang="en-SG" sz="1400"/>
+            <a:endParaRPr lang="en-SG" sz="1000"/>
           </a:p>
         </p:txBody>
       </p:sp>
@@ -3974,8 +3974,8 @@
         </p:nvCxnSpPr>
         <p:spPr>
           <a:xfrm>
-            <a:off x="419100" y="1261999"/>
-            <a:ext cx="1119851" cy="0"/>
+            <a:off x="211256" y="945696"/>
+            <a:ext cx="962936" cy="0"/>
           </a:xfrm>
           <a:prstGeom prst="straightConnector1">
             <a:avLst/>
@@ -4010,8 +4010,8 @@
         </p:nvSpPr>
         <p:spPr>
           <a:xfrm>
-            <a:off x="-152400" y="958034"/>
-            <a:ext cx="1729694" cy="215444"/>
+            <a:off x="-609600" y="745123"/>
+            <a:ext cx="1808141" cy="169277"/>
           </a:xfrm>
           <a:prstGeom prst="rect">
             <a:avLst/>
@@ -4026,7 +4026,7 @@
           <a:p>
             <a:pPr algn="r"/>
             <a:r>
-              <a:rPr lang="en-US" sz="1400" dirty="0">
+              <a:rPr lang="en-US" sz="1100" dirty="0">
                 <a:solidFill>
                   <a:srgbClr val="0070C0"/>
                 </a:solidFill>
@@ -4034,7 +4034,7 @@
               <a:t>execute(“</a:t>
             </a:r>
             <a:r>
-              <a:rPr lang="en-US" sz="1400" dirty="0" err="1">
+              <a:rPr lang="en-US" sz="1100" dirty="0" err="1">
                 <a:solidFill>
                   <a:srgbClr val="0070C0"/>
                 </a:solidFill>
@@ -4042,7 +4042,7 @@
               <a:t>addmh</a:t>
             </a:r>
             <a:r>
-              <a:rPr lang="en-US" sz="1400" dirty="0">
+              <a:rPr lang="en-US" sz="1100" dirty="0">
                 <a:solidFill>
                   <a:srgbClr val="0070C0"/>
                 </a:solidFill>
@@ -4062,8 +4062,8 @@
         </p:nvCxnSpPr>
         <p:spPr>
           <a:xfrm flipV="1">
-            <a:off x="4135972" y="1512340"/>
-            <a:ext cx="922392" cy="1"/>
+            <a:off x="2669715" y="988765"/>
+            <a:ext cx="550830" cy="4853"/>
           </a:xfrm>
           <a:prstGeom prst="straightConnector1">
             <a:avLst/>
@@ -4098,8 +4098,8 @@
         </p:nvSpPr>
         <p:spPr>
           <a:xfrm>
-            <a:off x="2192191" y="2484071"/>
-            <a:ext cx="855809" cy="215444"/>
+            <a:off x="1447800" y="2055912"/>
+            <a:ext cx="1371600" cy="153888"/>
           </a:xfrm>
           <a:prstGeom prst="rect">
             <a:avLst/>
@@ -4124,8 +4124,8 @@
           </a:lstStyle>
           <a:p>
             <a:r>
-              <a:rPr lang="en-US" dirty="0"/>
-              <a:t>execute()</a:t>
+              <a:rPr lang="en-US" sz="1000" dirty="0"/>
+              <a:t>execute(model, history)</a:t>
             </a:r>
           </a:p>
         </p:txBody>
@@ -4135,13 +4135,14 @@
           <p:cNvPr id="34" name="Straight Arrow Connector 33"/>
           <p:cNvCxnSpPr>
             <a:cxnSpLocks/>
+            <a:endCxn id="21" idx="2"/>
           </p:cNvCxnSpPr>
           <p:nvPr/>
         </p:nvCxnSpPr>
         <p:spPr>
           <a:xfrm>
-            <a:off x="4109108" y="1878232"/>
-            <a:ext cx="843892" cy="11404"/>
+            <a:off x="3657600" y="1666995"/>
+            <a:ext cx="1063604" cy="9042"/>
           </a:xfrm>
           <a:prstGeom prst="straightConnector1">
             <a:avLst/>
@@ -4180,8 +4181,8 @@
         </p:nvCxnSpPr>
         <p:spPr>
           <a:xfrm>
-            <a:off x="1691351" y="1981200"/>
-            <a:ext cx="2104508" cy="0"/>
+            <a:off x="1314578" y="1915588"/>
+            <a:ext cx="1236461" cy="0"/>
           </a:xfrm>
           <a:prstGeom prst="straightConnector1">
             <a:avLst/>
@@ -4220,8 +4221,8 @@
         </p:nvCxnSpPr>
         <p:spPr>
           <a:xfrm>
-            <a:off x="380999" y="4191000"/>
-            <a:ext cx="1196051" cy="0"/>
+            <a:off x="484610" y="3202468"/>
+            <a:ext cx="1028459" cy="0"/>
           </a:xfrm>
           <a:prstGeom prst="straightConnector1">
             <a:avLst/>
@@ -4258,8 +4259,8 @@
         </p:nvSpPr>
         <p:spPr>
           <a:xfrm>
-            <a:off x="4953000" y="2653307"/>
-            <a:ext cx="207694" cy="1385292"/>
+            <a:off x="4388503" y="2182576"/>
+            <a:ext cx="210786" cy="953031"/>
           </a:xfrm>
           <a:prstGeom prst="rect">
             <a:avLst/>
@@ -4293,7 +4294,7 @@
           <a:lstStyle/>
           <a:p>
             <a:pPr algn="ctr"/>
-            <a:endParaRPr lang="en-SG" sz="1400"/>
+            <a:endParaRPr lang="en-SG" sz="1000"/>
           </a:p>
         </p:txBody>
       </p:sp>
@@ -4305,8 +4306,8 @@
         </p:nvSpPr>
         <p:spPr>
           <a:xfrm>
-            <a:off x="5285911" y="3168134"/>
-            <a:ext cx="1876889" cy="184666"/>
+            <a:off x="4707305" y="2398044"/>
+            <a:ext cx="1613897" cy="138499"/>
           </a:xfrm>
           <a:prstGeom prst="rect">
             <a:avLst/>
@@ -4332,7 +4333,7 @@
           <a:p>
             <a:pPr algn="l"/>
             <a:r>
-              <a:rPr lang="en-US" sz="1200" dirty="0" err="1">
+              <a:rPr lang="en-US" sz="900" dirty="0" err="1">
                 <a:solidFill>
                   <a:srgbClr val="7030A0"/>
                 </a:solidFill>
@@ -4340,14 +4341,14 @@
               <a:t>updatePerson</a:t>
             </a:r>
             <a:r>
-              <a:rPr lang="en-US" sz="1200" dirty="0">
+              <a:rPr lang="en-US" sz="900" dirty="0">
                 <a:solidFill>
                   <a:srgbClr val="7030A0"/>
                 </a:solidFill>
               </a:rPr>
               <a:t>(model, history)</a:t>
             </a:r>
-            <a:endParaRPr lang="en-US" sz="1200" dirty="0"/>
+            <a:endParaRPr lang="en-US" sz="900" dirty="0"/>
           </a:p>
         </p:txBody>
       </p:sp>
@@ -4359,8 +4360,8 @@
         </p:nvSpPr>
         <p:spPr>
           <a:xfrm>
-            <a:off x="1447800" y="1106151"/>
-            <a:ext cx="2348059" cy="215444"/>
+            <a:off x="800354" y="745123"/>
+            <a:ext cx="2019046" cy="153888"/>
           </a:xfrm>
           <a:prstGeom prst="rect">
             <a:avLst/>
@@ -4385,19 +4386,19 @@
           </a:lstStyle>
           <a:p>
             <a:r>
-              <a:rPr lang="en-US" dirty="0" err="1"/>
+              <a:rPr lang="en-US" sz="1000" dirty="0" err="1"/>
               <a:t>parseCommand</a:t>
             </a:r>
             <a:r>
-              <a:rPr lang="en-US" dirty="0"/>
+              <a:rPr lang="en-US" sz="1000" dirty="0"/>
               <a:t>(“</a:t>
             </a:r>
             <a:r>
-              <a:rPr lang="en-US" dirty="0" err="1"/>
+              <a:rPr lang="en-US" sz="1000" dirty="0" err="1"/>
               <a:t>addmh</a:t>
             </a:r>
             <a:r>
-              <a:rPr lang="en-US" dirty="0"/>
+              <a:rPr lang="en-US" sz="1000" dirty="0"/>
               <a:t> …”)</a:t>
             </a:r>
           </a:p>
@@ -4411,8 +4412,8 @@
         </p:nvSpPr>
         <p:spPr>
           <a:xfrm>
-            <a:off x="2133600" y="3791076"/>
-            <a:ext cx="621216" cy="215444"/>
+            <a:off x="1686132" y="2887952"/>
+            <a:ext cx="534170" cy="153888"/>
           </a:xfrm>
           <a:prstGeom prst="rect">
             <a:avLst/>
@@ -4437,7 +4438,7 @@
           </a:lstStyle>
           <a:p>
             <a:r>
-              <a:rPr lang="en-US" dirty="0"/>
+              <a:rPr lang="en-US" sz="1000" dirty="0"/>
               <a:t>result</a:t>
             </a:r>
           </a:p>
@@ -4451,8 +4452,8 @@
         </p:nvSpPr>
         <p:spPr>
           <a:xfrm>
-            <a:off x="645270" y="3945901"/>
-            <a:ext cx="762000" cy="215444"/>
+            <a:off x="712124" y="3009713"/>
+            <a:ext cx="655227" cy="153888"/>
           </a:xfrm>
           <a:prstGeom prst="rect">
             <a:avLst/>
@@ -4477,7 +4478,7 @@
           </a:lstStyle>
           <a:p>
             <a:r>
-              <a:rPr lang="en-US" dirty="0"/>
+              <a:rPr lang="en-US" sz="1000" dirty="0"/>
               <a:t>result</a:t>
             </a:r>
           </a:p>
@@ -4491,8 +4492,8 @@
         </p:nvSpPr>
         <p:spPr>
           <a:xfrm>
-            <a:off x="7709814" y="2568606"/>
-            <a:ext cx="2181777" cy="335427"/>
+            <a:off x="6851612" y="1764227"/>
+            <a:ext cx="2216188" cy="400420"/>
           </a:xfrm>
           <a:prstGeom prst="rect">
             <a:avLst/>
@@ -4527,7 +4528,7 @@
           <a:p>
             <a:pPr algn="ctr"/>
             <a:r>
-              <a:rPr lang="en-US" sz="1600" dirty="0">
+              <a:rPr lang="en-US" sz="1050" dirty="0">
                 <a:solidFill>
                   <a:schemeClr val="bg1"/>
                 </a:solidFill>
@@ -4535,14 +4536,14 @@
               <a:t>:</a:t>
             </a:r>
             <a:r>
-              <a:rPr lang="en-US" sz="1600" dirty="0" err="1">
+              <a:rPr lang="en-US" sz="1050" dirty="0" err="1">
                 <a:solidFill>
                   <a:schemeClr val="bg1"/>
                 </a:solidFill>
               </a:rPr>
               <a:t>VersionedAddressBook</a:t>
             </a:r>
-            <a:endParaRPr lang="en-SG" sz="1600" dirty="0">
+            <a:endParaRPr lang="en-SG" sz="1050" dirty="0">
               <a:solidFill>
                 <a:schemeClr val="bg1"/>
               </a:solidFill>
@@ -4558,8 +4559,8 @@
         </p:nvSpPr>
         <p:spPr>
           <a:xfrm>
-            <a:off x="8726866" y="3182840"/>
-            <a:ext cx="129933" cy="398562"/>
+            <a:off x="7669660" y="2409610"/>
+            <a:ext cx="111726" cy="328692"/>
           </a:xfrm>
           <a:prstGeom prst="rect">
             <a:avLst/>
@@ -4593,7 +4594,7 @@
           <a:lstStyle/>
           <a:p>
             <a:pPr algn="ctr"/>
-            <a:endParaRPr lang="en-SG" sz="1400"/>
+            <a:endParaRPr lang="en-SG" sz="1000"/>
           </a:p>
         </p:txBody>
       </p:sp>
@@ -4605,8 +4606,8 @@
         </p:nvSpPr>
         <p:spPr>
           <a:xfrm>
-            <a:off x="2590800" y="1752600"/>
-            <a:ext cx="220343" cy="215444"/>
+            <a:off x="1774940" y="1752600"/>
+            <a:ext cx="189468" cy="153888"/>
           </a:xfrm>
           <a:prstGeom prst="rect">
             <a:avLst/>
@@ -4631,7 +4632,7 @@
           </a:lstStyle>
           <a:p>
             <a:r>
-              <a:rPr lang="en-US" dirty="0"/>
+              <a:rPr lang="en-US" sz="1000" dirty="0"/>
               <a:t>a</a:t>
             </a:r>
           </a:p>
@@ -4645,8 +4646,8 @@
         </p:nvSpPr>
         <p:spPr>
           <a:xfrm>
-            <a:off x="6762424" y="2362200"/>
-            <a:ext cx="841636" cy="300180"/>
+            <a:off x="5918054" y="1764226"/>
+            <a:ext cx="843332" cy="406183"/>
           </a:xfrm>
           <a:prstGeom prst="rect">
             <a:avLst/>
@@ -4681,14 +4682,14 @@
           <a:p>
             <a:pPr algn="ctr"/>
             <a:r>
-              <a:rPr lang="en-US" sz="1600" dirty="0">
+              <a:rPr lang="en-US" sz="1050" dirty="0">
                 <a:solidFill>
                   <a:schemeClr val="bg1"/>
                 </a:solidFill>
               </a:rPr>
               <a:t>: Model</a:t>
             </a:r>
-            <a:endParaRPr lang="en-SG" sz="1600" dirty="0">
+            <a:endParaRPr lang="en-SG" sz="1050" dirty="0">
               <a:solidFill>
                 <a:schemeClr val="bg1"/>
               </a:solidFill>
@@ -4706,8 +4707,8 @@
         </p:nvCxnSpPr>
         <p:spPr>
           <a:xfrm flipH="1">
-            <a:off x="7199150" y="2653306"/>
-            <a:ext cx="3959" cy="1735710"/>
+            <a:off x="6357837" y="1993164"/>
+            <a:ext cx="5" cy="1431431"/>
           </a:xfrm>
           <a:prstGeom prst="line">
             <a:avLst/>
@@ -4743,8 +4744,8 @@
         </p:nvSpPr>
         <p:spPr>
           <a:xfrm>
-            <a:off x="7100186" y="2958106"/>
-            <a:ext cx="168896" cy="775693"/>
+            <a:off x="6269233" y="2232871"/>
+            <a:ext cx="145230" cy="639710"/>
           </a:xfrm>
           <a:prstGeom prst="rect">
             <a:avLst/>
@@ -4778,7 +4779,7 @@
           <a:lstStyle/>
           <a:p>
             <a:pPr algn="ctr"/>
-            <a:endParaRPr lang="en-SG" sz="1400"/>
+            <a:endParaRPr lang="en-SG" sz="1000"/>
           </a:p>
         </p:txBody>
       </p:sp>
@@ -4792,8 +4793,8 @@
         </p:nvCxnSpPr>
         <p:spPr>
           <a:xfrm flipV="1">
-            <a:off x="5158639" y="2975344"/>
-            <a:ext cx="1935995" cy="1"/>
+            <a:off x="4597734" y="2246428"/>
+            <a:ext cx="1664721" cy="1"/>
           </a:xfrm>
           <a:prstGeom prst="straightConnector1">
             <a:avLst/>
@@ -4828,8 +4829,8 @@
         </p:nvSpPr>
         <p:spPr>
           <a:xfrm>
-            <a:off x="5035976" y="1260268"/>
-            <a:ext cx="1935995" cy="226877"/>
+            <a:off x="4185192" y="986993"/>
+            <a:ext cx="1148808" cy="308407"/>
           </a:xfrm>
           <a:prstGeom prst="rect">
             <a:avLst/>
@@ -4864,7 +4865,7 @@
           <a:p>
             <a:pPr algn="ctr"/>
             <a:r>
-              <a:rPr lang="en-US" sz="1600" dirty="0">
+              <a:rPr lang="en-US" sz="1050" dirty="0">
                 <a:solidFill>
                   <a:schemeClr val="bg1"/>
                 </a:solidFill>
@@ -4872,14 +4873,14 @@
               <a:t>a: </a:t>
             </a:r>
             <a:r>
-              <a:rPr lang="en-US" sz="1600" dirty="0" err="1">
+              <a:rPr lang="en-US" sz="1050" dirty="0" err="1">
                 <a:solidFill>
                   <a:schemeClr val="bg1"/>
                 </a:solidFill>
               </a:rPr>
               <a:t>AddmhCommand</a:t>
             </a:r>
-            <a:endParaRPr lang="en-SG" sz="1600" dirty="0">
+            <a:endParaRPr lang="en-SG" sz="1050" dirty="0">
               <a:solidFill>
                 <a:schemeClr val="bg1"/>
               </a:solidFill>
@@ -4903,8 +4904,8 @@
         </p:nvCxnSpPr>
         <p:spPr>
           <a:xfrm flipV="1">
-            <a:off x="1691351" y="2699515"/>
-            <a:ext cx="3251889" cy="31801"/>
+            <a:off x="1295400" y="2203877"/>
+            <a:ext cx="3079204" cy="4707"/>
           </a:xfrm>
           <a:prstGeom prst="straightConnector1">
             <a:avLst/>
@@ -4947,8 +4948,8 @@
         </p:nvCxnSpPr>
         <p:spPr>
           <a:xfrm flipV="1">
-            <a:off x="1708245" y="1351537"/>
-            <a:ext cx="2187935" cy="12381"/>
+            <a:off x="1295400" y="910245"/>
+            <a:ext cx="1238850" cy="4155"/>
           </a:xfrm>
           <a:prstGeom prst="straightConnector1">
             <a:avLst/>
@@ -4992,8 +4993,8 @@
         </p:nvCxnSpPr>
         <p:spPr>
           <a:xfrm>
-            <a:off x="1691998" y="4036462"/>
-            <a:ext cx="3364849" cy="2137"/>
+            <a:off x="1613264" y="3080933"/>
+            <a:ext cx="2880632" cy="54674"/>
           </a:xfrm>
           <a:prstGeom prst="straightConnector1">
             <a:avLst/>
@@ -5038,8 +5039,8 @@
         </p:nvCxnSpPr>
         <p:spPr>
           <a:xfrm>
-            <a:off x="8800702" y="2871355"/>
-            <a:ext cx="17996" cy="1467648"/>
+            <a:off x="7733227" y="2164646"/>
+            <a:ext cx="15474" cy="1210362"/>
           </a:xfrm>
           <a:prstGeom prst="line">
             <a:avLst/>
@@ -5075,8 +5076,8 @@
         </p:nvSpPr>
         <p:spPr>
           <a:xfrm>
-            <a:off x="7826375" y="2975344"/>
-            <a:ext cx="2460625" cy="184666"/>
+            <a:off x="6894419" y="2246427"/>
+            <a:ext cx="2115839" cy="138499"/>
           </a:xfrm>
           <a:prstGeom prst="rect">
             <a:avLst/>
@@ -5105,7 +5106,7 @@
           <a:p>
             <a:pPr algn="l"/>
             <a:r>
-              <a:rPr lang="en-US" sz="1200" dirty="0" err="1">
+              <a:rPr lang="en-US" sz="900" dirty="0" err="1">
                 <a:solidFill>
                   <a:srgbClr val="7030A0"/>
                 </a:solidFill>
@@ -5113,7 +5114,7 @@
               <a:t>updatePerson</a:t>
             </a:r>
             <a:r>
-              <a:rPr lang="en-US" sz="1200" dirty="0">
+              <a:rPr lang="en-US" sz="900" dirty="0">
                 <a:solidFill>
                   <a:schemeClr val="accent4">
                     <a:lumMod val="75000"/>
@@ -5123,7 +5124,7 @@
               <a:t>(target, </a:t>
             </a:r>
             <a:r>
-              <a:rPr lang="en-US" sz="1200" dirty="0" err="1">
+              <a:rPr lang="en-US" sz="900" dirty="0" err="1">
                 <a:solidFill>
                   <a:schemeClr val="accent4">
                     <a:lumMod val="75000"/>
@@ -5133,7 +5134,7 @@
               <a:t>editedPerson</a:t>
             </a:r>
             <a:r>
-              <a:rPr lang="en-US" sz="1200" dirty="0">
+              <a:rPr lang="en-US" sz="900" dirty="0">
                 <a:solidFill>
                   <a:schemeClr val="accent4">
                     <a:lumMod val="75000"/>
@@ -5155,8 +5156,8 @@
         </p:nvCxnSpPr>
         <p:spPr>
           <a:xfrm>
-            <a:off x="7256650" y="3182839"/>
-            <a:ext cx="1470216" cy="0"/>
+            <a:off x="6403935" y="2409610"/>
+            <a:ext cx="1264208" cy="0"/>
           </a:xfrm>
           <a:prstGeom prst="straightConnector1">
             <a:avLst/>
@@ -5198,9 +5199,9 @@
           <p:nvPr/>
         </p:nvCxnSpPr>
         <p:spPr>
-          <a:xfrm flipV="1">
-            <a:off x="7256650" y="3564914"/>
-            <a:ext cx="1470216" cy="6325"/>
+          <a:xfrm>
+            <a:off x="6403935" y="2715064"/>
+            <a:ext cx="1264208" cy="241"/>
           </a:xfrm>
           <a:prstGeom prst="straightConnector1">
             <a:avLst/>
@@ -5246,8 +5247,8 @@
         </p:nvCxnSpPr>
         <p:spPr>
           <a:xfrm>
-            <a:off x="5158639" y="3733799"/>
-            <a:ext cx="2025995" cy="0"/>
+            <a:off x="4597734" y="2842907"/>
+            <a:ext cx="1744115" cy="29674"/>
           </a:xfrm>
           <a:prstGeom prst="straightConnector1">
             <a:avLst/>
@@ -5276,12 +5277,57 @@
           </a:fontRef>
         </p:style>
       </p:cxnSp>
-      <p:sp>
-        <p:nvSpPr>
-          <p:cNvPr id="98" name="Rectangle 62">
+      <p:cxnSp>
+        <p:nvCxnSpPr>
+          <p:cNvPr id="99" name="Straight Connector 98">
             <a:extLst>
               <a:ext uri="{FF2B5EF4-FFF2-40B4-BE49-F238E27FC236}">
-                <a16:creationId xmlns:a16="http://schemas.microsoft.com/office/drawing/2014/main" id="{2B997070-3436-4436-84E2-A3B09EF562A4}"/>
+                <a16:creationId xmlns:a16="http://schemas.microsoft.com/office/drawing/2014/main" id="{03F18E06-18C7-4D6C-AD01-8269DEF70CD1}"/>
+              </a:ext>
+            </a:extLst>
+          </p:cNvPr>
+          <p:cNvCxnSpPr>
+            <a:cxnSpLocks/>
+          </p:cNvCxnSpPr>
+          <p:nvPr/>
+        </p:nvCxnSpPr>
+        <p:spPr>
+          <a:xfrm>
+            <a:off x="1236184" y="3700600"/>
+            <a:ext cx="0" cy="2871093"/>
+          </a:xfrm>
+          <a:prstGeom prst="line">
+            <a:avLst/>
+          </a:prstGeom>
+          <a:ln w="19050">
+            <a:solidFill>
+              <a:srgbClr val="0070C0"/>
+            </a:solidFill>
+            <a:prstDash val="sysDash"/>
+          </a:ln>
+          <a:effectLst/>
+        </p:spPr>
+        <p:style>
+          <a:lnRef idx="1">
+            <a:schemeClr val="accent1"/>
+          </a:lnRef>
+          <a:fillRef idx="2">
+            <a:schemeClr val="accent1"/>
+          </a:fillRef>
+          <a:effectRef idx="1">
+            <a:schemeClr val="accent1"/>
+          </a:effectRef>
+          <a:fontRef idx="minor">
+            <a:schemeClr val="dk1"/>
+          </a:fontRef>
+        </p:style>
+      </p:cxnSp>
+      <p:sp>
+        <p:nvSpPr>
+          <p:cNvPr id="100" name="Rectangle 99">
+            <a:extLst>
+              <a:ext uri="{FF2B5EF4-FFF2-40B4-BE49-F238E27FC236}">
+                <a16:creationId xmlns:a16="http://schemas.microsoft.com/office/drawing/2014/main" id="{AC83857E-58A0-4707-BEE5-04D7162579B6}"/>
               </a:ext>
             </a:extLst>
           </p:cNvPr>
@@ -5290,8 +5336,61 @@
         </p:nvSpPr>
         <p:spPr>
           <a:xfrm>
-            <a:off x="883145" y="4460730"/>
-            <a:ext cx="1455629" cy="346760"/>
+            <a:off x="1174192" y="3976400"/>
+            <a:ext cx="131045" cy="2418574"/>
+          </a:xfrm>
+          <a:prstGeom prst="rect">
+            <a:avLst/>
+          </a:prstGeom>
+          <a:solidFill>
+            <a:srgbClr val="0070C0"/>
+          </a:solidFill>
+          <a:ln>
+            <a:solidFill>
+              <a:srgbClr val="0070C0"/>
+            </a:solidFill>
+          </a:ln>
+          <a:effectLst/>
+        </p:spPr>
+        <p:style>
+          <a:lnRef idx="1">
+            <a:schemeClr val="accent3"/>
+          </a:lnRef>
+          <a:fillRef idx="2">
+            <a:schemeClr val="accent3"/>
+          </a:fillRef>
+          <a:effectRef idx="1">
+            <a:schemeClr val="accent3"/>
+          </a:effectRef>
+          <a:fontRef idx="minor">
+            <a:schemeClr val="dk1"/>
+          </a:fontRef>
+        </p:style>
+        <p:txBody>
+          <a:bodyPr rtlCol="0" anchor="ctr"/>
+          <a:lstStyle/>
+          <a:p>
+            <a:pPr algn="ctr"/>
+            <a:endParaRPr lang="en-SG" sz="1000"/>
+          </a:p>
+        </p:txBody>
+      </p:sp>
+      <p:sp>
+        <p:nvSpPr>
+          <p:cNvPr id="101" name="Rectangle 62">
+            <a:extLst>
+              <a:ext uri="{FF2B5EF4-FFF2-40B4-BE49-F238E27FC236}">
+                <a16:creationId xmlns:a16="http://schemas.microsoft.com/office/drawing/2014/main" id="{08A09C01-7D93-4601-8D3F-9810BDDB5920}"/>
+              </a:ext>
+            </a:extLst>
+          </p:cNvPr>
+          <p:cNvSpPr/>
+          <p:nvPr/>
+        </p:nvSpPr>
+        <p:spPr>
+          <a:xfrm>
+            <a:off x="3115717" y="3319494"/>
+            <a:ext cx="1206536" cy="447487"/>
           </a:xfrm>
           <a:prstGeom prst="rect">
             <a:avLst/>
@@ -5326,22 +5425,25 @@
           <a:p>
             <a:pPr algn="ctr"/>
             <a:r>
-              <a:rPr lang="en-US" sz="1600" dirty="0">
+              <a:rPr lang="en-US" sz="1050" dirty="0">
                 <a:solidFill>
                   <a:schemeClr val="bg1"/>
                 </a:solidFill>
               </a:rPr>
-              <a:t>:</a:t>
-            </a:r>
-            <a:r>
-              <a:rPr lang="en-US" sz="1600" dirty="0" err="1">
+              <a:t>:Address</a:t>
+            </a:r>
+          </a:p>
+          <a:p>
+            <a:pPr algn="ctr"/>
+            <a:r>
+              <a:rPr lang="en-US" sz="1050" dirty="0" err="1">
                 <a:solidFill>
                   <a:schemeClr val="bg1"/>
                 </a:solidFill>
               </a:rPr>
-              <a:t>LogicManager</a:t>
-            </a:r>
-            <a:endParaRPr lang="en-SG" sz="1600" dirty="0">
+              <a:t>BookParser</a:t>
+            </a:r>
+            <a:endParaRPr lang="en-SG" sz="1050" dirty="0">
               <a:solidFill>
                 <a:schemeClr val="bg1"/>
               </a:solidFill>
@@ -5351,10 +5453,10 @@
       </p:sp>
       <p:cxnSp>
         <p:nvCxnSpPr>
-          <p:cNvPr id="99" name="Straight Connector 98">
+          <p:cNvPr id="102" name="Straight Connector 101">
             <a:extLst>
               <a:ext uri="{FF2B5EF4-FFF2-40B4-BE49-F238E27FC236}">
-                <a16:creationId xmlns:a16="http://schemas.microsoft.com/office/drawing/2014/main" id="{03F18E06-18C7-4D6C-AD01-8269DEF70CD1}"/>
+                <a16:creationId xmlns:a16="http://schemas.microsoft.com/office/drawing/2014/main" id="{B25D69C3-E694-4922-BC20-AE44CAE44799}"/>
               </a:ext>
             </a:extLst>
           </p:cNvPr>
@@ -5365,8 +5467,8 @@
         </p:nvCxnSpPr>
         <p:spPr>
           <a:xfrm>
-            <a:off x="1610959" y="4824401"/>
-            <a:ext cx="0" cy="3481399"/>
+            <a:off x="3562540" y="3700600"/>
+            <a:ext cx="0" cy="1223010"/>
           </a:xfrm>
           <a:prstGeom prst="line">
             <a:avLst/>
@@ -5396,10 +5498,10 @@
       </p:cxnSp>
       <p:sp>
         <p:nvSpPr>
-          <p:cNvPr id="100" name="Rectangle 99">
+          <p:cNvPr id="103" name="Rectangle 102">
             <a:extLst>
               <a:ext uri="{FF2B5EF4-FFF2-40B4-BE49-F238E27FC236}">
-                <a16:creationId xmlns:a16="http://schemas.microsoft.com/office/drawing/2014/main" id="{AC83857E-58A0-4707-BEE5-04D7162579B6}"/>
+                <a16:creationId xmlns:a16="http://schemas.microsoft.com/office/drawing/2014/main" id="{D55BC24D-356C-4BE1-BC65-14AC9DF018D3}"/>
               </a:ext>
             </a:extLst>
           </p:cNvPr>
@@ -5408,8 +5510,8 @@
         </p:nvSpPr>
         <p:spPr>
           <a:xfrm>
-            <a:off x="1538951" y="5175095"/>
-            <a:ext cx="152400" cy="2932689"/>
+            <a:off x="3500548" y="4038862"/>
+            <a:ext cx="164890" cy="656345"/>
           </a:xfrm>
           <a:prstGeom prst="rect">
             <a:avLst/>
@@ -5443,181 +5545,7 @@
           <a:lstStyle/>
           <a:p>
             <a:pPr algn="ctr"/>
-            <a:endParaRPr lang="en-SG" sz="1400"/>
-          </a:p>
-        </p:txBody>
-      </p:sp>
-      <p:sp>
-        <p:nvSpPr>
-          <p:cNvPr id="101" name="Rectangle 62">
-            <a:extLst>
-              <a:ext uri="{FF2B5EF4-FFF2-40B4-BE49-F238E27FC236}">
-                <a16:creationId xmlns:a16="http://schemas.microsoft.com/office/drawing/2014/main" id="{08A09C01-7D93-4601-8D3F-9810BDDB5920}"/>
-              </a:ext>
-            </a:extLst>
-          </p:cNvPr>
-          <p:cNvSpPr/>
-          <p:nvPr/>
-        </p:nvSpPr>
-        <p:spPr>
-          <a:xfrm>
-            <a:off x="3437188" y="4339806"/>
-            <a:ext cx="1219200" cy="467684"/>
-          </a:xfrm>
-          <a:prstGeom prst="rect">
-            <a:avLst/>
-          </a:prstGeom>
-          <a:solidFill>
-            <a:srgbClr val="0070C0"/>
-          </a:solidFill>
-          <a:ln w="19050">
-            <a:solidFill>
-              <a:srgbClr val="0070C0"/>
-            </a:solidFill>
-          </a:ln>
-          <a:effectLst/>
-        </p:spPr>
-        <p:style>
-          <a:lnRef idx="1">
-            <a:schemeClr val="accent2"/>
-          </a:lnRef>
-          <a:fillRef idx="2">
-            <a:schemeClr val="accent2"/>
-          </a:fillRef>
-          <a:effectRef idx="1">
-            <a:schemeClr val="accent2"/>
-          </a:effectRef>
-          <a:fontRef idx="minor">
-            <a:schemeClr val="dk1"/>
-          </a:fontRef>
-        </p:style>
-        <p:txBody>
-          <a:bodyPr rtlCol="0" anchor="ctr"/>
-          <a:lstStyle/>
-          <a:p>
-            <a:pPr algn="ctr"/>
-            <a:r>
-              <a:rPr lang="en-US" sz="1600" dirty="0">
-                <a:solidFill>
-                  <a:schemeClr val="bg1"/>
-                </a:solidFill>
-              </a:rPr>
-              <a:t>:Address</a:t>
-            </a:r>
-          </a:p>
-          <a:p>
-            <a:pPr algn="ctr"/>
-            <a:r>
-              <a:rPr lang="en-US" sz="1600" dirty="0" err="1">
-                <a:solidFill>
-                  <a:schemeClr val="bg1"/>
-                </a:solidFill>
-              </a:rPr>
-              <a:t>BookParser</a:t>
-            </a:r>
-            <a:endParaRPr lang="en-SG" sz="1600" dirty="0">
-              <a:solidFill>
-                <a:schemeClr val="bg1"/>
-              </a:solidFill>
-            </a:endParaRPr>
-          </a:p>
-        </p:txBody>
-      </p:sp>
-      <p:cxnSp>
-        <p:nvCxnSpPr>
-          <p:cNvPr id="102" name="Straight Connector 101">
-            <a:extLst>
-              <a:ext uri="{FF2B5EF4-FFF2-40B4-BE49-F238E27FC236}">
-                <a16:creationId xmlns:a16="http://schemas.microsoft.com/office/drawing/2014/main" id="{B25D69C3-E694-4922-BC20-AE44CAE44799}"/>
-              </a:ext>
-            </a:extLst>
-          </p:cNvPr>
-          <p:cNvCxnSpPr>
-            <a:cxnSpLocks/>
-          </p:cNvCxnSpPr>
-          <p:nvPr/>
-        </p:nvCxnSpPr>
-        <p:spPr>
-          <a:xfrm>
-            <a:off x="3956199" y="4824401"/>
-            <a:ext cx="0" cy="1482984"/>
-          </a:xfrm>
-          <a:prstGeom prst="line">
-            <a:avLst/>
-          </a:prstGeom>
-          <a:ln w="19050">
-            <a:solidFill>
-              <a:srgbClr val="0070C0"/>
-            </a:solidFill>
-            <a:prstDash val="sysDash"/>
-          </a:ln>
-          <a:effectLst/>
-        </p:spPr>
-        <p:style>
-          <a:lnRef idx="1">
-            <a:schemeClr val="accent1"/>
-          </a:lnRef>
-          <a:fillRef idx="2">
-            <a:schemeClr val="accent1"/>
-          </a:fillRef>
-          <a:effectRef idx="1">
-            <a:schemeClr val="accent1"/>
-          </a:effectRef>
-          <a:fontRef idx="minor">
-            <a:schemeClr val="dk1"/>
-          </a:fontRef>
-        </p:style>
-      </p:cxnSp>
-      <p:sp>
-        <p:nvSpPr>
-          <p:cNvPr id="103" name="Rectangle 102">
-            <a:extLst>
-              <a:ext uri="{FF2B5EF4-FFF2-40B4-BE49-F238E27FC236}">
-                <a16:creationId xmlns:a16="http://schemas.microsoft.com/office/drawing/2014/main" id="{D55BC24D-356C-4BE1-BC65-14AC9DF018D3}"/>
-              </a:ext>
-            </a:extLst>
-          </p:cNvPr>
-          <p:cNvSpPr/>
-          <p:nvPr/>
-        </p:nvSpPr>
-        <p:spPr>
-          <a:xfrm>
-            <a:off x="3884192" y="5254520"/>
-            <a:ext cx="191760" cy="795864"/>
-          </a:xfrm>
-          <a:prstGeom prst="rect">
-            <a:avLst/>
-          </a:prstGeom>
-          <a:solidFill>
-            <a:srgbClr val="0070C0"/>
-          </a:solidFill>
-          <a:ln>
-            <a:solidFill>
-              <a:srgbClr val="0070C0"/>
-            </a:solidFill>
-          </a:ln>
-          <a:effectLst/>
-        </p:spPr>
-        <p:style>
-          <a:lnRef idx="1">
-            <a:schemeClr val="accent3"/>
-          </a:lnRef>
-          <a:fillRef idx="2">
-            <a:schemeClr val="accent3"/>
-          </a:fillRef>
-          <a:effectRef idx="1">
-            <a:schemeClr val="accent3"/>
-          </a:effectRef>
-          <a:fontRef idx="minor">
-            <a:schemeClr val="dk1"/>
-          </a:fontRef>
-        </p:style>
-        <p:txBody>
-          <a:bodyPr rtlCol="0" anchor="ctr"/>
-          <a:lstStyle/>
-          <a:p>
-            <a:pPr algn="ctr"/>
-            <a:endParaRPr lang="en-SG" sz="1400">
+            <a:endParaRPr lang="en-SG" sz="1000">
               <a:solidFill>
                 <a:schemeClr val="dk1"/>
               </a:solidFill>
@@ -5642,8 +5570,8 @@
         </p:nvCxnSpPr>
         <p:spPr>
           <a:xfrm>
-            <a:off x="5029200" y="5621981"/>
-            <a:ext cx="17888" cy="2553014"/>
+            <a:off x="4486220" y="4327849"/>
+            <a:ext cx="15478" cy="2007793"/>
           </a:xfrm>
           <a:prstGeom prst="line">
             <a:avLst/>
@@ -5685,8 +5613,8 @@
         </p:nvSpPr>
         <p:spPr>
           <a:xfrm>
-            <a:off x="4953000" y="5621981"/>
-            <a:ext cx="152400" cy="276003"/>
+            <a:off x="4420697" y="4327849"/>
+            <a:ext cx="131045" cy="227619"/>
           </a:xfrm>
           <a:prstGeom prst="rect">
             <a:avLst/>
@@ -5720,7 +5648,7 @@
           <a:lstStyle/>
           <a:p>
             <a:pPr algn="ctr"/>
-            <a:endParaRPr lang="en-SG" sz="1400"/>
+            <a:endParaRPr lang="en-SG" sz="1000"/>
           </a:p>
         </p:txBody>
       </p:sp>
@@ -5740,8 +5668,8 @@
         </p:nvCxnSpPr>
         <p:spPr>
           <a:xfrm>
-            <a:off x="419100" y="5178783"/>
-            <a:ext cx="1119851" cy="0"/>
+            <a:off x="517412" y="3979301"/>
+            <a:ext cx="962936" cy="0"/>
           </a:xfrm>
           <a:prstGeom prst="straightConnector1">
             <a:avLst/>
@@ -5782,8 +5710,8 @@
         </p:nvSpPr>
         <p:spPr>
           <a:xfrm>
-            <a:off x="-152400" y="4874818"/>
-            <a:ext cx="1729694" cy="215444"/>
+            <a:off x="-66343" y="3607976"/>
+            <a:ext cx="1809619" cy="153888"/>
           </a:xfrm>
           <a:prstGeom prst="rect">
             <a:avLst/>
@@ -5798,7 +5726,7 @@
           <a:p>
             <a:pPr algn="r"/>
             <a:r>
-              <a:rPr lang="en-US" sz="1400" dirty="0">
+              <a:rPr lang="en-US" sz="1000" dirty="0">
                 <a:solidFill>
                   <a:srgbClr val="0070C0"/>
                 </a:solidFill>
@@ -5806,7 +5734,7 @@
               <a:t>execute(“</a:t>
             </a:r>
             <a:r>
-              <a:rPr lang="en-US" sz="1400" dirty="0" err="1">
+              <a:rPr lang="en-US" sz="1000" dirty="0" err="1">
                 <a:solidFill>
                   <a:srgbClr val="0070C0"/>
                 </a:solidFill>
@@ -5814,7 +5742,7 @@
               <a:t>viewmh</a:t>
             </a:r>
             <a:r>
-              <a:rPr lang="en-US" sz="1400" dirty="0">
+              <a:rPr lang="en-US" sz="1000" dirty="0">
                 <a:solidFill>
                   <a:srgbClr val="0070C0"/>
                 </a:solidFill>
@@ -5840,8 +5768,8 @@
         </p:nvCxnSpPr>
         <p:spPr>
           <a:xfrm>
-            <a:off x="4036590" y="5417721"/>
-            <a:ext cx="1021774" cy="11404"/>
+            <a:off x="3631749" y="4167211"/>
+            <a:ext cx="878602" cy="9405"/>
           </a:xfrm>
           <a:prstGeom prst="straightConnector1">
             <a:avLst/>
@@ -5882,8 +5810,8 @@
         </p:nvSpPr>
         <p:spPr>
           <a:xfrm>
-            <a:off x="2192191" y="6400855"/>
-            <a:ext cx="855809" cy="215444"/>
+            <a:off x="2043886" y="4940387"/>
+            <a:ext cx="735892" cy="153888"/>
           </a:xfrm>
           <a:prstGeom prst="rect">
             <a:avLst/>
@@ -5908,7 +5836,7 @@
           </a:lstStyle>
           <a:p>
             <a:r>
-              <a:rPr lang="en-US" dirty="0"/>
+              <a:rPr lang="en-US" sz="1000" dirty="0"/>
               <a:t>execute()</a:t>
             </a:r>
           </a:p>
@@ -5930,8 +5858,8 @@
         </p:nvCxnSpPr>
         <p:spPr>
           <a:xfrm>
-            <a:off x="4109108" y="5795016"/>
-            <a:ext cx="843892" cy="11404"/>
+            <a:off x="3694181" y="4463931"/>
+            <a:ext cx="725645" cy="9405"/>
           </a:xfrm>
           <a:prstGeom prst="straightConnector1">
             <a:avLst/>
@@ -5976,8 +5904,8 @@
         </p:nvCxnSpPr>
         <p:spPr>
           <a:xfrm>
-            <a:off x="1691351" y="5897984"/>
-            <a:ext cx="2104508" cy="0"/>
+            <a:off x="1612707" y="4544909"/>
+            <a:ext cx="1809622" cy="0"/>
           </a:xfrm>
           <a:prstGeom prst="straightConnector1">
             <a:avLst/>
@@ -6022,8 +5950,8 @@
         </p:nvCxnSpPr>
         <p:spPr>
           <a:xfrm>
-            <a:off x="380999" y="8107784"/>
-            <a:ext cx="1196051" cy="0"/>
+            <a:off x="484610" y="6282785"/>
+            <a:ext cx="1028459" cy="0"/>
           </a:xfrm>
           <a:prstGeom prst="straightConnector1">
             <a:avLst/>
@@ -6066,8 +5994,8 @@
         </p:nvSpPr>
         <p:spPr>
           <a:xfrm>
-            <a:off x="4953000" y="6570091"/>
-            <a:ext cx="207694" cy="1385292"/>
+            <a:off x="4420697" y="5073480"/>
+            <a:ext cx="178592" cy="1142444"/>
           </a:xfrm>
           <a:prstGeom prst="rect">
             <a:avLst/>
@@ -6101,7 +6029,7 @@
           <a:lstStyle/>
           <a:p>
             <a:pPr algn="ctr"/>
-            <a:endParaRPr lang="en-SG" sz="1400"/>
+            <a:endParaRPr lang="en-SG" sz="1000"/>
           </a:p>
         </p:txBody>
       </p:sp>
@@ -6119,8 +6047,8 @@
         </p:nvSpPr>
         <p:spPr>
           <a:xfrm>
-            <a:off x="1447800" y="5022935"/>
-            <a:ext cx="2348059" cy="215444"/>
+            <a:off x="1403031" y="3856735"/>
+            <a:ext cx="2019046" cy="153888"/>
           </a:xfrm>
           <a:prstGeom prst="rect">
             <a:avLst/>
@@ -6145,19 +6073,19 @@
           </a:lstStyle>
           <a:p>
             <a:r>
-              <a:rPr lang="en-US" dirty="0" err="1"/>
+              <a:rPr lang="en-US" sz="1000" dirty="0" err="1"/>
               <a:t>parseCommand</a:t>
             </a:r>
             <a:r>
-              <a:rPr lang="en-US" dirty="0"/>
+              <a:rPr lang="en-US" sz="1000" dirty="0"/>
               <a:t>(“</a:t>
             </a:r>
             <a:r>
-              <a:rPr lang="en-US" dirty="0" err="1"/>
+              <a:rPr lang="en-US" sz="1000" dirty="0" err="1"/>
               <a:t>viewmh</a:t>
             </a:r>
             <a:r>
-              <a:rPr lang="en-US" dirty="0"/>
+              <a:rPr lang="en-US" sz="1000" dirty="0"/>
               <a:t> …”)</a:t>
             </a:r>
           </a:p>
@@ -6177,8 +6105,8 @@
         </p:nvSpPr>
         <p:spPr>
           <a:xfrm>
-            <a:off x="2133600" y="7707860"/>
-            <a:ext cx="621216" cy="215444"/>
+            <a:off x="1686132" y="5968269"/>
+            <a:ext cx="534170" cy="153888"/>
           </a:xfrm>
           <a:prstGeom prst="rect">
             <a:avLst/>
@@ -6203,7 +6131,7 @@
           </a:lstStyle>
           <a:p>
             <a:r>
-              <a:rPr lang="en-US" dirty="0"/>
+              <a:rPr lang="en-US" sz="1000" dirty="0"/>
               <a:t>result</a:t>
             </a:r>
           </a:p>
@@ -6223,8 +6151,8 @@
         </p:nvSpPr>
         <p:spPr>
           <a:xfrm>
-            <a:off x="645270" y="7862685"/>
-            <a:ext cx="762000" cy="215444"/>
+            <a:off x="712124" y="6090029"/>
+            <a:ext cx="655227" cy="153888"/>
           </a:xfrm>
           <a:prstGeom prst="rect">
             <a:avLst/>
@@ -6249,7 +6177,7 @@
           </a:lstStyle>
           <a:p>
             <a:r>
-              <a:rPr lang="en-US" dirty="0"/>
+              <a:rPr lang="en-US" sz="1000" dirty="0"/>
               <a:t>result</a:t>
             </a:r>
           </a:p>
@@ -6269,8 +6197,8 @@
         </p:nvSpPr>
         <p:spPr>
           <a:xfrm>
-            <a:off x="2590800" y="5669384"/>
-            <a:ext cx="220343" cy="215444"/>
+            <a:off x="2079740" y="4365129"/>
+            <a:ext cx="189468" cy="153888"/>
           </a:xfrm>
           <a:prstGeom prst="rect">
             <a:avLst/>
@@ -6295,7 +6223,7 @@
           </a:lstStyle>
           <a:p>
             <a:r>
-              <a:rPr lang="en-US" dirty="0"/>
+              <a:rPr lang="en-US" sz="1000" dirty="0"/>
               <a:t>v</a:t>
             </a:r>
           </a:p>
@@ -6315,8 +6243,8 @@
         </p:nvSpPr>
         <p:spPr>
           <a:xfrm>
-            <a:off x="5035977" y="5029200"/>
-            <a:ext cx="2025994" cy="462177"/>
+            <a:off x="4492133" y="3861662"/>
+            <a:ext cx="2064848" cy="429087"/>
           </a:xfrm>
           <a:prstGeom prst="rect">
             <a:avLst/>
@@ -6351,7 +6279,7 @@
           <a:p>
             <a:pPr algn="ctr"/>
             <a:r>
-              <a:rPr lang="en-US" sz="1600" dirty="0">
+              <a:rPr lang="en-US" sz="1050" dirty="0">
                 <a:solidFill>
                   <a:schemeClr val="bg1"/>
                 </a:solidFill>
@@ -6359,14 +6287,14 @@
               <a:t>v: </a:t>
             </a:r>
             <a:r>
-              <a:rPr lang="en-US" sz="1600" dirty="0" err="1">
+              <a:rPr lang="en-US" sz="1050" dirty="0" err="1">
                 <a:solidFill>
                   <a:schemeClr val="bg1"/>
                 </a:solidFill>
               </a:rPr>
               <a:t>ViewmhCommand</a:t>
             </a:r>
-            <a:endParaRPr lang="en-SG" sz="1600" dirty="0">
+            <a:endParaRPr lang="en-SG" sz="1050" dirty="0">
               <a:solidFill>
                 <a:schemeClr val="bg1"/>
               </a:solidFill>
@@ -6389,9 +6317,9 @@
           <p:nvPr/>
         </p:nvCxnSpPr>
         <p:spPr>
-          <a:xfrm flipV="1">
-            <a:off x="1691351" y="6616299"/>
-            <a:ext cx="3251889" cy="31801"/>
+          <a:xfrm>
+            <a:off x="1612707" y="5134831"/>
+            <a:ext cx="2796230" cy="1216"/>
           </a:xfrm>
           <a:prstGeom prst="straightConnector1">
             <a:avLst/>
@@ -6433,9 +6361,9 @@
           <p:nvPr/>
         </p:nvCxnSpPr>
         <p:spPr>
-          <a:xfrm flipV="1">
-            <a:off x="1708245" y="5268321"/>
-            <a:ext cx="2187935" cy="12381"/>
+          <a:xfrm>
+            <a:off x="1627251" y="4059455"/>
+            <a:ext cx="1881359" cy="473"/>
           </a:xfrm>
           <a:prstGeom prst="straightConnector1">
             <a:avLst/>
@@ -6479,8 +6407,8 @@
         </p:nvCxnSpPr>
         <p:spPr>
           <a:xfrm>
-            <a:off x="1691998" y="7953246"/>
-            <a:ext cx="3364849" cy="2137"/>
+            <a:off x="1613264" y="6161250"/>
+            <a:ext cx="2896729" cy="54674"/>
           </a:xfrm>
           <a:prstGeom prst="straightConnector1">
             <a:avLst/>
@@ -6509,6 +6437,364 @@
           </a:fontRef>
         </p:style>
       </p:cxnSp>
+      <p:sp>
+        <p:nvSpPr>
+          <p:cNvPr id="114" name="Rectangle 62">
+            <a:extLst>
+              <a:ext uri="{FF2B5EF4-FFF2-40B4-BE49-F238E27FC236}">
+                <a16:creationId xmlns:a16="http://schemas.microsoft.com/office/drawing/2014/main" id="{C66C1827-EFC8-4A6F-B155-11BB882064CF}"/>
+              </a:ext>
+            </a:extLst>
+          </p:cNvPr>
+          <p:cNvSpPr/>
+          <p:nvPr/>
+        </p:nvSpPr>
+        <p:spPr>
+          <a:xfrm>
+            <a:off x="3200400" y="533400"/>
+            <a:ext cx="682886" cy="545611"/>
+          </a:xfrm>
+          <a:prstGeom prst="rect">
+            <a:avLst/>
+          </a:prstGeom>
+          <a:solidFill>
+            <a:srgbClr val="0070C0"/>
+          </a:solidFill>
+          <a:ln w="19050">
+            <a:solidFill>
+              <a:srgbClr val="0070C0"/>
+            </a:solidFill>
+          </a:ln>
+          <a:effectLst/>
+        </p:spPr>
+        <p:style>
+          <a:lnRef idx="1">
+            <a:schemeClr val="accent2"/>
+          </a:lnRef>
+          <a:fillRef idx="2">
+            <a:schemeClr val="accent2"/>
+          </a:fillRef>
+          <a:effectRef idx="1">
+            <a:schemeClr val="accent2"/>
+          </a:effectRef>
+          <a:fontRef idx="minor">
+            <a:schemeClr val="dk1"/>
+          </a:fontRef>
+        </p:style>
+        <p:txBody>
+          <a:bodyPr rtlCol="0" anchor="ctr"/>
+          <a:lstStyle/>
+          <a:p>
+            <a:pPr algn="ctr"/>
+            <a:r>
+              <a:rPr lang="en-US" sz="1050" dirty="0">
+                <a:solidFill>
+                  <a:schemeClr val="bg1"/>
+                </a:solidFill>
+              </a:rPr>
+              <a:t>:</a:t>
+            </a:r>
+            <a:r>
+              <a:rPr lang="en-US" sz="1050" dirty="0" err="1">
+                <a:solidFill>
+                  <a:schemeClr val="bg1"/>
+                </a:solidFill>
+              </a:rPr>
+              <a:t>AddmhCommandParser</a:t>
+            </a:r>
+            <a:endParaRPr lang="en-US" sz="1050" dirty="0">
+              <a:solidFill>
+                <a:schemeClr val="bg1"/>
+              </a:solidFill>
+            </a:endParaRPr>
+          </a:p>
+        </p:txBody>
+      </p:sp>
+      <p:sp>
+        <p:nvSpPr>
+          <p:cNvPr id="141" name="Rectangle 140">
+            <a:extLst>
+              <a:ext uri="{FF2B5EF4-FFF2-40B4-BE49-F238E27FC236}">
+                <a16:creationId xmlns:a16="http://schemas.microsoft.com/office/drawing/2014/main" id="{CBC33D2E-1924-4A90-B5EB-E0260649EC66}"/>
+              </a:ext>
+            </a:extLst>
+          </p:cNvPr>
+          <p:cNvSpPr/>
+          <p:nvPr/>
+        </p:nvSpPr>
+        <p:spPr>
+          <a:xfrm>
+            <a:off x="3476320" y="1078995"/>
+            <a:ext cx="155429" cy="753615"/>
+          </a:xfrm>
+          <a:prstGeom prst="rect">
+            <a:avLst/>
+          </a:prstGeom>
+          <a:solidFill>
+            <a:srgbClr val="0070C0"/>
+          </a:solidFill>
+          <a:ln>
+            <a:solidFill>
+              <a:srgbClr val="0070C0"/>
+            </a:solidFill>
+          </a:ln>
+          <a:effectLst/>
+        </p:spPr>
+        <p:style>
+          <a:lnRef idx="1">
+            <a:schemeClr val="accent3"/>
+          </a:lnRef>
+          <a:fillRef idx="2">
+            <a:schemeClr val="accent3"/>
+          </a:fillRef>
+          <a:effectRef idx="1">
+            <a:schemeClr val="accent3"/>
+          </a:effectRef>
+          <a:fontRef idx="minor">
+            <a:schemeClr val="dk1"/>
+          </a:fontRef>
+        </p:style>
+        <p:txBody>
+          <a:bodyPr rtlCol="0" anchor="ctr"/>
+          <a:lstStyle/>
+          <a:p>
+            <a:pPr algn="ctr"/>
+            <a:endParaRPr lang="en-SG" sz="1000"/>
+          </a:p>
+        </p:txBody>
+      </p:sp>
+      <p:cxnSp>
+        <p:nvCxnSpPr>
+          <p:cNvPr id="142" name="Straight Arrow Connector 141">
+            <a:extLst>
+              <a:ext uri="{FF2B5EF4-FFF2-40B4-BE49-F238E27FC236}">
+                <a16:creationId xmlns:a16="http://schemas.microsoft.com/office/drawing/2014/main" id="{1357ED07-3DC3-4AAD-9F08-8074354059F2}"/>
+              </a:ext>
+            </a:extLst>
+          </p:cNvPr>
+          <p:cNvCxnSpPr>
+            <a:cxnSpLocks/>
+            <a:endCxn id="141" idx="2"/>
+          </p:cNvCxnSpPr>
+          <p:nvPr/>
+        </p:nvCxnSpPr>
+        <p:spPr>
+          <a:xfrm flipV="1">
+            <a:off x="2669715" y="1832610"/>
+            <a:ext cx="884320" cy="7844"/>
+          </a:xfrm>
+          <a:prstGeom prst="straightConnector1">
+            <a:avLst/>
+          </a:prstGeom>
+          <a:ln w="19050">
+            <a:solidFill>
+              <a:srgbClr val="0070C0"/>
+            </a:solidFill>
+            <a:prstDash val="sysDash"/>
+            <a:headEnd type="arrow" w="med" len="med"/>
+            <a:tailEnd type="none" w="med" len="med"/>
+          </a:ln>
+        </p:spPr>
+        <p:style>
+          <a:lnRef idx="1">
+            <a:schemeClr val="accent1"/>
+          </a:lnRef>
+          <a:fillRef idx="0">
+            <a:schemeClr val="accent1"/>
+          </a:fillRef>
+          <a:effectRef idx="0">
+            <a:schemeClr val="accent1"/>
+          </a:effectRef>
+          <a:fontRef idx="minor">
+            <a:schemeClr val="tx1"/>
+          </a:fontRef>
+        </p:style>
+      </p:cxnSp>
+      <p:cxnSp>
+        <p:nvCxnSpPr>
+          <p:cNvPr id="144" name="Straight Connector 143">
+            <a:extLst>
+              <a:ext uri="{FF2B5EF4-FFF2-40B4-BE49-F238E27FC236}">
+                <a16:creationId xmlns:a16="http://schemas.microsoft.com/office/drawing/2014/main" id="{D6AAE826-177C-4DA2-B083-7766BE0F9FB2}"/>
+              </a:ext>
+            </a:extLst>
+          </p:cNvPr>
+          <p:cNvCxnSpPr>
+            <a:cxnSpLocks/>
+          </p:cNvCxnSpPr>
+          <p:nvPr/>
+        </p:nvCxnSpPr>
+        <p:spPr>
+          <a:xfrm>
+            <a:off x="3569336" y="1371600"/>
+            <a:ext cx="687" cy="621564"/>
+          </a:xfrm>
+          <a:prstGeom prst="line">
+            <a:avLst/>
+          </a:prstGeom>
+          <a:ln w="19050">
+            <a:solidFill>
+              <a:srgbClr val="0070C0"/>
+            </a:solidFill>
+            <a:prstDash val="sysDash"/>
+          </a:ln>
+          <a:effectLst/>
+        </p:spPr>
+        <p:style>
+          <a:lnRef idx="1">
+            <a:schemeClr val="accent1"/>
+          </a:lnRef>
+          <a:fillRef idx="2">
+            <a:schemeClr val="accent1"/>
+          </a:fillRef>
+          <a:effectRef idx="1">
+            <a:schemeClr val="accent1"/>
+          </a:effectRef>
+          <a:fontRef idx="minor">
+            <a:schemeClr val="dk1"/>
+          </a:fontRef>
+        </p:style>
+      </p:cxnSp>
+      <p:sp>
+        <p:nvSpPr>
+          <p:cNvPr id="147" name="TextBox 146">
+            <a:extLst>
+              <a:ext uri="{FF2B5EF4-FFF2-40B4-BE49-F238E27FC236}">
+                <a16:creationId xmlns:a16="http://schemas.microsoft.com/office/drawing/2014/main" id="{7B31B01F-E460-43FC-A0FA-6D8C12546A5E}"/>
+              </a:ext>
+            </a:extLst>
+          </p:cNvPr>
+          <p:cNvSpPr txBox="1"/>
+          <p:nvPr/>
+        </p:nvSpPr>
+        <p:spPr>
+          <a:xfrm>
+            <a:off x="3429000" y="1979712"/>
+            <a:ext cx="177404" cy="153888"/>
+          </a:xfrm>
+          <a:prstGeom prst="rect">
+            <a:avLst/>
+          </a:prstGeom>
+          <a:noFill/>
+        </p:spPr>
+        <p:txBody>
+          <a:bodyPr wrap="square" lIns="0" tIns="0" rIns="0" bIns="0" rtlCol="0">
+            <a:spAutoFit/>
+          </a:bodyPr>
+          <a:lstStyle>
+            <a:defPPr>
+              <a:defRPr lang="en-US"/>
+            </a:defPPr>
+            <a:lvl1pPr algn="r">
+              <a:defRPr sz="1400">
+                <a:solidFill>
+                  <a:srgbClr val="0070C0"/>
+                </a:solidFill>
+              </a:defRPr>
+            </a:lvl1pPr>
+          </a:lstStyle>
+          <a:p>
+            <a:r>
+              <a:rPr lang="en-US" sz="1000" dirty="0">
+                <a:solidFill>
+                  <a:schemeClr val="tx1"/>
+                </a:solidFill>
+              </a:rPr>
+              <a:t>X</a:t>
+            </a:r>
+          </a:p>
+        </p:txBody>
+      </p:sp>
+      <p:cxnSp>
+        <p:nvCxnSpPr>
+          <p:cNvPr id="148" name="Straight Arrow Connector 147">
+            <a:extLst>
+              <a:ext uri="{FF2B5EF4-FFF2-40B4-BE49-F238E27FC236}">
+                <a16:creationId xmlns:a16="http://schemas.microsoft.com/office/drawing/2014/main" id="{D740C777-2986-4CD8-AD11-9CDD025DD29F}"/>
+              </a:ext>
+            </a:extLst>
+          </p:cNvPr>
+          <p:cNvCxnSpPr>
+            <a:cxnSpLocks/>
+          </p:cNvCxnSpPr>
+          <p:nvPr/>
+        </p:nvCxnSpPr>
+        <p:spPr>
+          <a:xfrm flipV="1">
+            <a:off x="3640170" y="1214347"/>
+            <a:ext cx="550830" cy="4853"/>
+          </a:xfrm>
+          <a:prstGeom prst="straightConnector1">
+            <a:avLst/>
+          </a:prstGeom>
+          <a:ln w="19050">
+            <a:solidFill>
+              <a:srgbClr val="0070C0"/>
+            </a:solidFill>
+            <a:tailEnd type="arrow"/>
+          </a:ln>
+        </p:spPr>
+        <p:style>
+          <a:lnRef idx="1">
+            <a:schemeClr val="accent1"/>
+          </a:lnRef>
+          <a:fillRef idx="0">
+            <a:schemeClr val="accent1"/>
+          </a:fillRef>
+          <a:effectRef idx="0">
+            <a:schemeClr val="accent1"/>
+          </a:effectRef>
+          <a:fontRef idx="minor">
+            <a:schemeClr val="tx1"/>
+          </a:fontRef>
+        </p:style>
+      </p:cxnSp>
+      <p:sp>
+        <p:nvSpPr>
+          <p:cNvPr id="151" name="TextBox 150">
+            <a:extLst>
+              <a:ext uri="{FF2B5EF4-FFF2-40B4-BE49-F238E27FC236}">
+                <a16:creationId xmlns:a16="http://schemas.microsoft.com/office/drawing/2014/main" id="{38490A73-20CE-4EA8-B7FB-6FB8BB5A6183}"/>
+              </a:ext>
+            </a:extLst>
+          </p:cNvPr>
+          <p:cNvSpPr txBox="1"/>
+          <p:nvPr/>
+        </p:nvSpPr>
+        <p:spPr>
+          <a:xfrm>
+            <a:off x="2934732" y="1676400"/>
+            <a:ext cx="189468" cy="153888"/>
+          </a:xfrm>
+          <a:prstGeom prst="rect">
+            <a:avLst/>
+          </a:prstGeom>
+          <a:noFill/>
+        </p:spPr>
+        <p:txBody>
+          <a:bodyPr wrap="square" lIns="0" tIns="0" rIns="0" bIns="0" rtlCol="0">
+            <a:spAutoFit/>
+          </a:bodyPr>
+          <a:lstStyle>
+            <a:defPPr>
+              <a:defRPr lang="en-US"/>
+            </a:defPPr>
+            <a:lvl1pPr algn="r">
+              <a:defRPr sz="1400">
+                <a:solidFill>
+                  <a:srgbClr val="0070C0"/>
+                </a:solidFill>
+              </a:defRPr>
+            </a:lvl1pPr>
+          </a:lstStyle>
+          <a:p>
+            <a:r>
+              <a:rPr lang="en-US" sz="1000" dirty="0"/>
+              <a:t>a</a:t>
+            </a:r>
+          </a:p>
+        </p:txBody>
+      </p:sp>
     </p:spTree>
     <p:extLst>
       <p:ext uri="{BB962C8B-B14F-4D97-AF65-F5344CB8AC3E}">

</xml_diff>

<commit_message>
Added description about sorting feature in user guide
</commit_message>
<xml_diff>
--- a/docs/diagrams/UndoRedoSequenceDiagram.pptx
+++ b/docs/diagrams/UndoRedoSequenceDiagram.pptx
@@ -208,7 +208,7 @@
           <a:p>
             <a:fld id="{F5CC4B3F-88C1-4FFA-B1B6-F41C21DC6924}" type="datetimeFigureOut">
               <a:rPr lang="en-US" smtClean="0"/>
-              <a:t>10/22/2018</a:t>
+              <a:t>11/1/18</a:t>
             </a:fld>
             <a:endParaRPr lang="en-US"/>
           </a:p>
@@ -654,7 +654,7 @@
           <a:p>
             <a:fld id="{78C97017-6FC3-485B-9764-EAC9E56C1D49}" type="datetimeFigureOut">
               <a:rPr lang="en-US" smtClean="0"/>
-              <a:t>10/22/2018</a:t>
+              <a:t>11/1/18</a:t>
             </a:fld>
             <a:endParaRPr lang="en-US"/>
           </a:p>
@@ -822,7 +822,7 @@
           <a:p>
             <a:fld id="{78C97017-6FC3-485B-9764-EAC9E56C1D49}" type="datetimeFigureOut">
               <a:rPr lang="en-US" smtClean="0"/>
-              <a:t>10/22/2018</a:t>
+              <a:t>11/1/18</a:t>
             </a:fld>
             <a:endParaRPr lang="en-US"/>
           </a:p>
@@ -1000,7 +1000,7 @@
           <a:p>
             <a:fld id="{78C97017-6FC3-485B-9764-EAC9E56C1D49}" type="datetimeFigureOut">
               <a:rPr lang="en-US" smtClean="0"/>
-              <a:t>10/22/2018</a:t>
+              <a:t>11/1/18</a:t>
             </a:fld>
             <a:endParaRPr lang="en-US"/>
           </a:p>
@@ -1168,7 +1168,7 @@
           <a:p>
             <a:fld id="{78C97017-6FC3-485B-9764-EAC9E56C1D49}" type="datetimeFigureOut">
               <a:rPr lang="en-US" smtClean="0"/>
-              <a:t>10/22/2018</a:t>
+              <a:t>11/1/18</a:t>
             </a:fld>
             <a:endParaRPr lang="en-US"/>
           </a:p>
@@ -1413,7 +1413,7 @@
           <a:p>
             <a:fld id="{78C97017-6FC3-485B-9764-EAC9E56C1D49}" type="datetimeFigureOut">
               <a:rPr lang="en-US" smtClean="0"/>
-              <a:t>10/22/2018</a:t>
+              <a:t>11/1/18</a:t>
             </a:fld>
             <a:endParaRPr lang="en-US"/>
           </a:p>
@@ -1698,7 +1698,7 @@
           <a:p>
             <a:fld id="{78C97017-6FC3-485B-9764-EAC9E56C1D49}" type="datetimeFigureOut">
               <a:rPr lang="en-US" smtClean="0"/>
-              <a:t>10/22/2018</a:t>
+              <a:t>11/1/18</a:t>
             </a:fld>
             <a:endParaRPr lang="en-US"/>
           </a:p>
@@ -2117,7 +2117,7 @@
           <a:p>
             <a:fld id="{78C97017-6FC3-485B-9764-EAC9E56C1D49}" type="datetimeFigureOut">
               <a:rPr lang="en-US" smtClean="0"/>
-              <a:t>10/22/2018</a:t>
+              <a:t>11/1/18</a:t>
             </a:fld>
             <a:endParaRPr lang="en-US"/>
           </a:p>
@@ -2234,7 +2234,7 @@
           <a:p>
             <a:fld id="{78C97017-6FC3-485B-9764-EAC9E56C1D49}" type="datetimeFigureOut">
               <a:rPr lang="en-US" smtClean="0"/>
-              <a:t>10/22/2018</a:t>
+              <a:t>11/1/18</a:t>
             </a:fld>
             <a:endParaRPr lang="en-US"/>
           </a:p>
@@ -2329,7 +2329,7 @@
           <a:p>
             <a:fld id="{78C97017-6FC3-485B-9764-EAC9E56C1D49}" type="datetimeFigureOut">
               <a:rPr lang="en-US" smtClean="0"/>
-              <a:t>10/22/2018</a:t>
+              <a:t>11/1/18</a:t>
             </a:fld>
             <a:endParaRPr lang="en-US"/>
           </a:p>
@@ -2604,7 +2604,7 @@
           <a:p>
             <a:fld id="{78C97017-6FC3-485B-9764-EAC9E56C1D49}" type="datetimeFigureOut">
               <a:rPr lang="en-US" smtClean="0"/>
-              <a:t>10/22/2018</a:t>
+              <a:t>11/1/18</a:t>
             </a:fld>
             <a:endParaRPr lang="en-US"/>
           </a:p>
@@ -2856,7 +2856,7 @@
           <a:p>
             <a:fld id="{78C97017-6FC3-485B-9764-EAC9E56C1D49}" type="datetimeFigureOut">
               <a:rPr lang="en-US" smtClean="0"/>
-              <a:t>10/22/2018</a:t>
+              <a:t>11/1/18</a:t>
             </a:fld>
             <a:endParaRPr lang="en-US"/>
           </a:p>
@@ -3067,7 +3067,7 @@
           <a:p>
             <a:fld id="{78C97017-6FC3-485B-9764-EAC9E56C1D49}" type="datetimeFigureOut">
               <a:rPr lang="en-US" smtClean="0"/>
-              <a:t>10/22/2018</a:t>
+              <a:t>11/1/18</a:t>
             </a:fld>
             <a:endParaRPr lang="en-US"/>
           </a:p>
@@ -3451,7 +3451,7 @@
         <p:spPr>
           <a:xfrm>
             <a:off x="6459374" y="118895"/>
-            <a:ext cx="3903825" cy="4400926"/>
+            <a:ext cx="4742026" cy="4400926"/>
           </a:xfrm>
           <a:prstGeom prst="roundRect">
             <a:avLst>
@@ -3511,7 +3511,7 @@
         </p:nvSpPr>
         <p:spPr>
           <a:xfrm>
-            <a:off x="467813" y="163018"/>
+            <a:off x="180913" y="181425"/>
             <a:ext cx="5863964" cy="4343400"/>
           </a:xfrm>
           <a:prstGeom prst="roundRect">
@@ -4027,7 +4027,23 @@
                   <a:srgbClr val="0070C0"/>
                 </a:solidFill>
               </a:rPr>
-              <a:t>execute(“undo”)</a:t>
+              <a:t>execute(“</a:t>
+            </a:r>
+            <a:r>
+              <a:rPr lang="en-US" altLang="zh-CN" sz="1400" dirty="0">
+                <a:solidFill>
+                  <a:srgbClr val="0070C0"/>
+                </a:solidFill>
+              </a:rPr>
+              <a:t>undo</a:t>
+            </a:r>
+            <a:r>
+              <a:rPr lang="en-US" sz="1400" dirty="0">
+                <a:solidFill>
+                  <a:srgbClr val="0070C0"/>
+                </a:solidFill>
+              </a:rPr>
+              <a:t>”)</a:t>
             </a:r>
           </a:p>
         </p:txBody>
@@ -4232,8 +4248,8 @@
         </p:nvSpPr>
         <p:spPr>
           <a:xfrm>
-            <a:off x="5526488" y="2731313"/>
-            <a:ext cx="161322" cy="1307285"/>
+            <a:off x="5523515" y="2717910"/>
+            <a:ext cx="164295" cy="1320687"/>
           </a:xfrm>
           <a:prstGeom prst="rect">
             <a:avLst/>
@@ -4279,7 +4295,7 @@
         </p:nvSpPr>
         <p:spPr>
           <a:xfrm>
-            <a:off x="5714083" y="2748246"/>
+            <a:off x="5710124" y="2730844"/>
             <a:ext cx="1448717" cy="184666"/>
           </a:xfrm>
           <a:prstGeom prst="rect">
@@ -4305,27 +4321,21 @@
           </a:lstStyle>
           <a:p>
             <a:r>
-              <a:rPr lang="en-US" sz="1200" dirty="0" err="1">
+              <a:rPr lang="en-US" altLang="zh-CN" sz="1200" dirty="0" err="1">
                 <a:solidFill>
                   <a:schemeClr val="accent4">
                     <a:lumMod val="75000"/>
                   </a:schemeClr>
                 </a:solidFill>
               </a:rPr>
-              <a:t>undo</a:t>
-            </a:r>
-            <a:r>
-              <a:rPr lang="en-US" sz="1200" dirty="0" err="1">
+              <a:t>undoSchedulePlanner</a:t>
+            </a:r>
+            <a:r>
+              <a:rPr lang="en-US" altLang="zh-CN" sz="1200" dirty="0">
                 <a:solidFill>
-                  <a:srgbClr val="7030A0"/>
-                </a:solidFill>
-              </a:rPr>
-              <a:t>SchedulePlanner</a:t>
-            </a:r>
-            <a:r>
-              <a:rPr lang="en-US" sz="1200" dirty="0">
-                <a:solidFill>
-                  <a:srgbClr val="7030A0"/>
+                  <a:schemeClr val="accent4">
+                    <a:lumMod val="75000"/>
+                  </a:schemeClr>
                 </a:solidFill>
               </a:rPr>
               <a:t>()</a:t>
@@ -4343,7 +4353,7 @@
         <p:spPr>
           <a:xfrm>
             <a:off x="1885189" y="1106150"/>
-            <a:ext cx="1899551" cy="215444"/>
+            <a:ext cx="2008781" cy="215444"/>
           </a:xfrm>
           <a:prstGeom prst="rect">
             <a:avLst/>
@@ -4373,7 +4383,15 @@
             </a:r>
             <a:r>
               <a:rPr lang="en-US" dirty="0"/>
-              <a:t>(“undo”)</a:t>
+              <a:t>(“</a:t>
+            </a:r>
+            <a:r>
+              <a:rPr lang="en-US" altLang="zh-CN" dirty="0"/>
+              <a:t>undo</a:t>
+            </a:r>
+            <a:r>
+              <a:rPr lang="en-US" dirty="0"/>
+              <a:t>”)</a:t>
             </a:r>
           </a:p>
         </p:txBody>
@@ -4606,9 +4624,10 @@
           </a:lstStyle>
           <a:p>
             <a:r>
-              <a:rPr lang="en-US" dirty="0"/>
+              <a:rPr lang="en-US" altLang="zh-CN" dirty="0"/>
               <a:t>u</a:t>
             </a:r>
+            <a:endParaRPr lang="en-US" dirty="0"/>
           </a:p>
         </p:txBody>
       </p:sp>
@@ -4620,7 +4639,7 @@
         </p:nvSpPr>
         <p:spPr>
           <a:xfrm>
-            <a:off x="6705600" y="2362200"/>
+            <a:off x="6732759" y="2353125"/>
             <a:ext cx="841636" cy="300180"/>
           </a:xfrm>
           <a:prstGeom prst="rect">
@@ -4768,7 +4787,7 @@
         <p:spPr>
           <a:xfrm>
             <a:off x="5685755" y="2975344"/>
-            <a:ext cx="1210345" cy="0"/>
+            <a:ext cx="1384349" cy="0"/>
           </a:xfrm>
           <a:prstGeom prst="straightConnector1">
             <a:avLst/>
@@ -4872,12 +4891,28 @@
           <a:p>
             <a:pPr algn="ctr"/>
             <a:r>
-              <a:rPr lang="en-US" sz="1600" dirty="0">
+              <a:rPr lang="en-US" altLang="zh-CN" sz="1600" dirty="0" err="1">
                 <a:solidFill>
                   <a:schemeClr val="bg1"/>
                 </a:solidFill>
               </a:rPr>
-              <a:t>u:Undo</a:t>
+              <a:t>u</a:t>
+            </a:r>
+            <a:r>
+              <a:rPr lang="en-US" sz="1600" dirty="0" err="1">
+                <a:solidFill>
+                  <a:schemeClr val="bg1"/>
+                </a:solidFill>
+              </a:rPr>
+              <a:t>:</a:t>
+            </a:r>
+            <a:r>
+              <a:rPr lang="en-US" altLang="zh-CN" sz="1600" dirty="0" err="1">
+                <a:solidFill>
+                  <a:schemeClr val="bg1"/>
+                </a:solidFill>
+              </a:rPr>
+              <a:t>Undo</a:t>
             </a:r>
             <a:br>
               <a:rPr lang="en-US" sz="1600" dirty="0">
@@ -5076,7 +5111,7 @@
           </a:lstStyle>
           <a:p>
             <a:r>
-              <a:rPr lang="en-US" sz="1200" dirty="0" err="1">
+              <a:rPr lang="en-US" altLang="zh-CN" sz="1200" dirty="0" err="1">
                 <a:solidFill>
                   <a:srgbClr val="7030A0"/>
                 </a:solidFill>
@@ -5164,8 +5199,8 @@
         </p:nvSpPr>
         <p:spPr>
           <a:xfrm>
-            <a:off x="7667691" y="2975344"/>
-            <a:ext cx="551687" cy="184666"/>
+            <a:off x="7066808" y="3000265"/>
+            <a:ext cx="1002846" cy="184666"/>
           </a:xfrm>
           <a:prstGeom prst="rect">
             <a:avLst/>
@@ -5193,7 +5228,15 @@
           </a:lstStyle>
           <a:p>
             <a:r>
-              <a:rPr lang="en-US" sz="1200" dirty="0">
+              <a:rPr lang="zh-CN" altLang="en-US" sz="1200" dirty="0">
+                <a:solidFill>
+                  <a:srgbClr val="7030A0"/>
+                </a:solidFill>
+              </a:rPr>
+              <a:t>  </a:t>
+            </a:r>
+            <a:r>
+              <a:rPr lang="en-US" altLang="zh-CN" sz="1200" dirty="0">
                 <a:solidFill>
                   <a:srgbClr val="7030A0"/>
                 </a:solidFill>

</xml_diff>

<commit_message>
UGDG changes for undoredo added undo-all and redo-all to UG
</commit_message>
<xml_diff>
--- a/docs/diagrams/UndoRedoSequenceDiagram.pptx
+++ b/docs/diagrams/UndoRedoSequenceDiagram.pptx
@@ -208,7 +208,7 @@
           <a:p>
             <a:fld id="{F5CC4B3F-88C1-4FFA-B1B6-F41C21DC6924}" type="datetimeFigureOut">
               <a:rPr lang="en-US" smtClean="0"/>
-              <a:t>11/1/18</a:t>
+              <a:t>11/3/18</a:t>
             </a:fld>
             <a:endParaRPr lang="en-US"/>
           </a:p>
@@ -743,7 +743,7 @@
           <a:p>
             <a:fld id="{78C97017-6FC3-485B-9764-EAC9E56C1D49}" type="datetimeFigureOut">
               <a:rPr lang="en-US" smtClean="0"/>
-              <a:t>11/1/18</a:t>
+              <a:t>11/3/18</a:t>
             </a:fld>
             <a:endParaRPr lang="en-US"/>
           </a:p>
@@ -911,7 +911,7 @@
           <a:p>
             <a:fld id="{78C97017-6FC3-485B-9764-EAC9E56C1D49}" type="datetimeFigureOut">
               <a:rPr lang="en-US" smtClean="0"/>
-              <a:t>11/1/18</a:t>
+              <a:t>11/3/18</a:t>
             </a:fld>
             <a:endParaRPr lang="en-US"/>
           </a:p>
@@ -1089,7 +1089,7 @@
           <a:p>
             <a:fld id="{78C97017-6FC3-485B-9764-EAC9E56C1D49}" type="datetimeFigureOut">
               <a:rPr lang="en-US" smtClean="0"/>
-              <a:t>11/1/18</a:t>
+              <a:t>11/3/18</a:t>
             </a:fld>
             <a:endParaRPr lang="en-US"/>
           </a:p>
@@ -1257,7 +1257,7 @@
           <a:p>
             <a:fld id="{78C97017-6FC3-485B-9764-EAC9E56C1D49}" type="datetimeFigureOut">
               <a:rPr lang="en-US" smtClean="0"/>
-              <a:t>11/1/18</a:t>
+              <a:t>11/3/18</a:t>
             </a:fld>
             <a:endParaRPr lang="en-US"/>
           </a:p>
@@ -1502,7 +1502,7 @@
           <a:p>
             <a:fld id="{78C97017-6FC3-485B-9764-EAC9E56C1D49}" type="datetimeFigureOut">
               <a:rPr lang="en-US" smtClean="0"/>
-              <a:t>11/1/18</a:t>
+              <a:t>11/3/18</a:t>
             </a:fld>
             <a:endParaRPr lang="en-US"/>
           </a:p>
@@ -1787,7 +1787,7 @@
           <a:p>
             <a:fld id="{78C97017-6FC3-485B-9764-EAC9E56C1D49}" type="datetimeFigureOut">
               <a:rPr lang="en-US" smtClean="0"/>
-              <a:t>11/1/18</a:t>
+              <a:t>11/3/18</a:t>
             </a:fld>
             <a:endParaRPr lang="en-US"/>
           </a:p>
@@ -2206,7 +2206,7 @@
           <a:p>
             <a:fld id="{78C97017-6FC3-485B-9764-EAC9E56C1D49}" type="datetimeFigureOut">
               <a:rPr lang="en-US" smtClean="0"/>
-              <a:t>11/1/18</a:t>
+              <a:t>11/3/18</a:t>
             </a:fld>
             <a:endParaRPr lang="en-US"/>
           </a:p>
@@ -2323,7 +2323,7 @@
           <a:p>
             <a:fld id="{78C97017-6FC3-485B-9764-EAC9E56C1D49}" type="datetimeFigureOut">
               <a:rPr lang="en-US" smtClean="0"/>
-              <a:t>11/1/18</a:t>
+              <a:t>11/3/18</a:t>
             </a:fld>
             <a:endParaRPr lang="en-US"/>
           </a:p>
@@ -2418,7 +2418,7 @@
           <a:p>
             <a:fld id="{78C97017-6FC3-485B-9764-EAC9E56C1D49}" type="datetimeFigureOut">
               <a:rPr lang="en-US" smtClean="0"/>
-              <a:t>11/1/18</a:t>
+              <a:t>11/3/18</a:t>
             </a:fld>
             <a:endParaRPr lang="en-US"/>
           </a:p>
@@ -2693,7 +2693,7 @@
           <a:p>
             <a:fld id="{78C97017-6FC3-485B-9764-EAC9E56C1D49}" type="datetimeFigureOut">
               <a:rPr lang="en-US" smtClean="0"/>
-              <a:t>11/1/18</a:t>
+              <a:t>11/3/18</a:t>
             </a:fld>
             <a:endParaRPr lang="en-US"/>
           </a:p>
@@ -2945,7 +2945,7 @@
           <a:p>
             <a:fld id="{78C97017-6FC3-485B-9764-EAC9E56C1D49}" type="datetimeFigureOut">
               <a:rPr lang="en-US" smtClean="0"/>
-              <a:t>11/1/18</a:t>
+              <a:t>11/3/18</a:t>
             </a:fld>
             <a:endParaRPr lang="en-US"/>
           </a:p>
@@ -3156,7 +3156,7 @@
           <a:p>
             <a:fld id="{78C97017-6FC3-485B-9764-EAC9E56C1D49}" type="datetimeFigureOut">
               <a:rPr lang="en-US" smtClean="0"/>
-              <a:t>11/1/18</a:t>
+              <a:t>11/3/18</a:t>
             </a:fld>
             <a:endParaRPr lang="en-US"/>
           </a:p>
@@ -5863,7 +5863,7 @@
         </p:nvCxnSpPr>
         <p:spPr>
           <a:xfrm>
-            <a:off x="6121369" y="3250419"/>
+            <a:off x="4323605" y="3391586"/>
             <a:ext cx="355631" cy="139737"/>
           </a:xfrm>
           <a:prstGeom prst="straightConnector1">
@@ -5902,8 +5902,8 @@
         </p:nvSpPr>
         <p:spPr>
           <a:xfrm>
-            <a:off x="6288004" y="3365040"/>
-            <a:ext cx="1633271" cy="461665"/>
+            <a:off x="4490240" y="3506207"/>
+            <a:ext cx="2050136" cy="461665"/>
           </a:xfrm>
           <a:prstGeom prst="rect">
             <a:avLst/>
@@ -5918,7 +5918,7 @@
           <a:p>
             <a:r>
               <a:rPr lang="en-US" sz="800" dirty="0"/>
-              <a:t>Here EventsCenter posts a ChangeImageEvent with the new image state (undone successful).</a:t>
+              <a:t>Here, a ChangeImageEvent is posted to the EventsCenter with the new image state (undo successful).</a:t>
             </a:r>
           </a:p>
         </p:txBody>

</xml_diff>